<commit_message>
minor edits to format and also added slide about multinomial logit
</commit_message>
<xml_diff>
--- a/Project3_presentation-1.pptx
+++ b/Project3_presentation-1.pptx
@@ -5,7 +5,7 @@
     <p:sldMasterId id="2147483660" r:id="rId1"/>
   </p:sldMasterIdLst>
   <p:notesMasterIdLst>
-    <p:notesMasterId r:id="rId16"/>
+    <p:notesMasterId r:id="rId18"/>
   </p:notesMasterIdLst>
   <p:sldIdLst>
     <p:sldId id="257" r:id="rId2"/>
@@ -17,11 +17,13 @@
     <p:sldId id="276" r:id="rId8"/>
     <p:sldId id="270" r:id="rId9"/>
     <p:sldId id="274" r:id="rId10"/>
-    <p:sldId id="275" r:id="rId11"/>
-    <p:sldId id="273" r:id="rId12"/>
+    <p:sldId id="273" r:id="rId11"/>
+    <p:sldId id="275" r:id="rId12"/>
     <p:sldId id="271" r:id="rId13"/>
     <p:sldId id="272" r:id="rId14"/>
     <p:sldId id="265" r:id="rId15"/>
+    <p:sldId id="277" r:id="rId16"/>
+    <p:sldId id="278" r:id="rId17"/>
   </p:sldIdLst>
   <p:sldSz cx="9144000" cy="6858000" type="screen4x3"/>
   <p:notesSz cx="6858000" cy="9144000"/>
@@ -573,6 +575,107 @@
 </p:notes>
 </file>
 
+<file path=ppt/notesSlides/notesSlide10.xml><?xml version="1.0" encoding="utf-8"?>
+<p:notes xmlns:a="http://schemas.openxmlformats.org/drawingml/2006/main" xmlns:r="http://schemas.openxmlformats.org/officeDocument/2006/relationships" xmlns:p="http://schemas.openxmlformats.org/presentationml/2006/main">
+  <p:cSld>
+    <p:spTree>
+      <p:nvGrpSpPr>
+        <p:cNvPr id="1" name=""/>
+        <p:cNvGrpSpPr/>
+        <p:nvPr/>
+      </p:nvGrpSpPr>
+      <p:grpSpPr>
+        <a:xfrm>
+          <a:off x="0" y="0"/>
+          <a:ext cx="0" cy="0"/>
+          <a:chOff x="0" y="0"/>
+          <a:chExt cx="0" cy="0"/>
+        </a:xfrm>
+      </p:grpSpPr>
+      <p:sp>
+        <p:nvSpPr>
+          <p:cNvPr id="2" name="Slide Image Placeholder 1"/>
+          <p:cNvSpPr>
+            <a:spLocks noGrp="1" noRot="1" noChangeAspect="1"/>
+          </p:cNvSpPr>
+          <p:nvPr>
+            <p:ph type="sldImg"/>
+          </p:nvPr>
+        </p:nvSpPr>
+        <p:spPr/>
+      </p:sp>
+      <p:sp>
+        <p:nvSpPr>
+          <p:cNvPr id="3" name="Notes Placeholder 2"/>
+          <p:cNvSpPr>
+            <a:spLocks noGrp="1"/>
+          </p:cNvSpPr>
+          <p:nvPr>
+            <p:ph type="body" idx="1"/>
+          </p:nvPr>
+        </p:nvSpPr>
+        <p:spPr/>
+        <p:txBody>
+          <a:bodyPr/>
+          <a:lstStyle/>
+          <a:p>
+            <a:pPr marL="0" marR="0" indent="0" algn="l" defTabSz="914400" rtl="0" eaLnBrk="1" fontAlgn="auto" latinLnBrk="0" hangingPunct="1">
+              <a:lnSpc>
+                <a:spcPct val="100000"/>
+              </a:lnSpc>
+              <a:spcBef>
+                <a:spcPts val="0"/>
+              </a:spcBef>
+              <a:spcAft>
+                <a:spcPts val="0"/>
+              </a:spcAft>
+              <a:buClrTx/>
+              <a:buSzTx/>
+              <a:buFontTx/>
+              <a:buNone/>
+              <a:tabLst/>
+              <a:defRPr/>
+            </a:pPr>
+            <a:endParaRPr lang="en-US" dirty="0" smtClean="0"/>
+          </a:p>
+        </p:txBody>
+      </p:sp>
+      <p:sp>
+        <p:nvSpPr>
+          <p:cNvPr id="4" name="Slide Number Placeholder 3"/>
+          <p:cNvSpPr>
+            <a:spLocks noGrp="1"/>
+          </p:cNvSpPr>
+          <p:nvPr>
+            <p:ph type="sldNum" sz="quarter" idx="10"/>
+          </p:nvPr>
+        </p:nvSpPr>
+        <p:spPr/>
+        <p:txBody>
+          <a:bodyPr/>
+          <a:lstStyle/>
+          <a:p>
+            <a:fld id="{DB34B17C-0F30-4E49-87BD-B713E7BA160F}" type="slidenum">
+              <a:rPr lang="en-US" smtClean="0"/>
+              <a:t>16</a:t>
+            </a:fld>
+            <a:endParaRPr lang="en-US"/>
+          </a:p>
+        </p:txBody>
+      </p:sp>
+    </p:spTree>
+    <p:extLst>
+      <p:ext uri="{BB962C8B-B14F-4D97-AF65-F5344CB8AC3E}">
+        <p14:creationId xmlns:p14="http://schemas.microsoft.com/office/powerpoint/2010/main" val="2480207448"/>
+      </p:ext>
+    </p:extLst>
+  </p:cSld>
+  <p:clrMapOvr>
+    <a:masterClrMapping/>
+  </p:clrMapOvr>
+</p:notes>
+</file>
+
 <file path=ppt/notesSlides/notesSlide2.xml><?xml version="1.0" encoding="utf-8"?>
 <p:notes xmlns:a="http://schemas.openxmlformats.org/drawingml/2006/main" xmlns:r="http://schemas.openxmlformats.org/officeDocument/2006/relationships" xmlns:p="http://schemas.openxmlformats.org/presentationml/2006/main">
   <p:cSld>
@@ -1108,10 +1211,6 @@
           </a:bodyPr>
           <a:lstStyle/>
           <a:p>
-            <a:r>
-              <a:rPr lang="en-US" dirty="0" smtClean="0"/>
-              <a:t>Predicted years for songs</a:t>
-            </a:r>
             <a:endParaRPr lang="en-US" dirty="0"/>
           </a:p>
         </p:txBody>
@@ -1194,6 +1293,10 @@
           </a:bodyPr>
           <a:lstStyle/>
           <a:p>
+            <a:r>
+              <a:rPr lang="en-US" dirty="0" smtClean="0"/>
+              <a:t>Predicted years for songs</a:t>
+            </a:r>
             <a:endParaRPr lang="en-US" dirty="0"/>
           </a:p>
         </p:txBody>
@@ -5700,7 +5803,7 @@
               </a14:hiddenLine>
             </a:ext>
             <a:ext uri="{FAA26D3D-D897-4be2-8F04-BA451C77F1D7}">
-              <ma14:placeholderFlag xmlns="" xmlns:ma14="http://schemas.microsoft.com/office/mac/drawingml/2011/main" xmlns:mv="urn:schemas-microsoft-com:mac:vml" xmlns:mc="http://schemas.openxmlformats.org/markup-compatibility/2006" val="1"/>
+              <ma14:placeholderFlag xmlns:mc="http://schemas.openxmlformats.org/markup-compatibility/2006" xmlns:mv="urn:schemas-microsoft-com:mac:vml" xmlns:ma14="http://schemas.microsoft.com/office/mac/drawingml/2011/main" xmlns="" val="1"/>
             </a:ext>
           </a:extLst>
         </p:spPr>
@@ -5761,7 +5864,7 @@
               </a14:hiddenLine>
             </a:ext>
             <a:ext uri="{FAA26D3D-D897-4be2-8F04-BA451C77F1D7}">
-              <ma14:placeholderFlag xmlns="" xmlns:ma14="http://schemas.microsoft.com/office/mac/drawingml/2011/main" xmlns:mv="urn:schemas-microsoft-com:mac:vml" xmlns:mc="http://schemas.openxmlformats.org/markup-compatibility/2006" val="1"/>
+              <ma14:placeholderFlag xmlns:mc="http://schemas.openxmlformats.org/markup-compatibility/2006" xmlns:mv="urn:schemas-microsoft-com:mac:vml" xmlns:ma14="http://schemas.microsoft.com/office/mac/drawingml/2011/main" xmlns="" val="1"/>
             </a:ext>
           </a:extLst>
         </p:spPr>
@@ -6682,6 +6785,43 @@
           <a:chExt cx="0" cy="0"/>
         </a:xfrm>
       </p:grpSpPr>
+      <p:pic>
+        <p:nvPicPr>
+          <p:cNvPr id="6" name="Content Placeholder 5" descr="plot_resids.pdf"/>
+          <p:cNvPicPr>
+            <a:picLocks noGrp="1" noChangeAspect="1"/>
+          </p:cNvPicPr>
+          <p:nvPr>
+            <p:ph idx="1"/>
+          </p:nvPr>
+        </p:nvPicPr>
+        <mc:AlternateContent xmlns:mc="http://schemas.openxmlformats.org/markup-compatibility/2006">
+          <mc:Choice xmlns="" xmlns:mv="urn:schemas-microsoft-com:mac:vml" xmlns:ma="http://schemas.microsoft.com/office/mac/drawingml/2008/main" Requires="ma">
+            <p:blipFill>
+              <a:blip r:embed="rId3"/>
+              <a:srcRect l="-2632" r="-2632"/>
+              <a:stretch>
+                <a:fillRect/>
+              </a:stretch>
+            </p:blipFill>
+          </mc:Choice>
+          <mc:Fallback>
+            <p:blipFill>
+              <a:blip r:embed="rId4"/>
+              <a:srcRect l="-2632" r="-2632"/>
+              <a:stretch>
+                <a:fillRect/>
+              </a:stretch>
+            </p:blipFill>
+          </mc:Fallback>
+        </mc:AlternateContent>
+        <p:spPr>
+          <a:xfrm>
+            <a:off x="184484" y="1143000"/>
+            <a:ext cx="8807116" cy="4648200"/>
+          </a:xfrm>
+        </p:spPr>
+      </p:pic>
       <p:sp>
         <p:nvSpPr>
           <p:cNvPr id="2" name="Title 1"/>
@@ -6765,120 +6905,33 @@
       </p:sp>
       <p:sp>
         <p:nvSpPr>
-          <p:cNvPr id="3" name="Content Placeholder 2"/>
-          <p:cNvSpPr>
-            <a:spLocks noGrp="1"/>
-          </p:cNvSpPr>
-          <p:nvPr>
-            <p:ph idx="1"/>
-          </p:nvPr>
-        </p:nvSpPr>
-        <p:spPr/>
-        <p:txBody>
-          <a:bodyPr/>
+          <p:cNvPr id="3" name="Rectangle 2"/>
+          <p:cNvSpPr/>
+          <p:nvPr/>
+        </p:nvSpPr>
+        <p:spPr>
+          <a:xfrm>
+            <a:off x="1295400" y="1524000"/>
+            <a:ext cx="5867400" cy="830997"/>
+          </a:xfrm>
+          <a:prstGeom prst="rect">
+            <a:avLst/>
+          </a:prstGeom>
+        </p:spPr>
+        <p:txBody>
+          <a:bodyPr wrap="square">
+            <a:spAutoFit/>
+          </a:bodyPr>
           <a:lstStyle/>
           <a:p>
             <a:r>
-              <a:rPr lang="en-US" dirty="0"/>
-              <a:t>The data was heavily skewed in favor of the 1990s and </a:t>
-            </a:r>
-            <a:r>
-              <a:rPr lang="en-US" dirty="0" smtClean="0"/>
-              <a:t>2000s</a:t>
-            </a:r>
-          </a:p>
-          <a:p>
-            <a:r>
-              <a:rPr lang="en-US" dirty="0" smtClean="0"/>
-              <a:t>The </a:t>
-            </a:r>
-            <a:r>
-              <a:rPr lang="en-US" dirty="0"/>
-              <a:t>model overestimated the year of release for earlier songs (1920 to 1980</a:t>
-            </a:r>
-            <a:r>
-              <a:rPr lang="en-US" dirty="0" smtClean="0"/>
-              <a:t>).</a:t>
-            </a:r>
-          </a:p>
-          <a:p>
-            <a:r>
-              <a:rPr lang="en-US" dirty="0" smtClean="0"/>
-              <a:t>All the multiple </a:t>
-            </a:r>
-            <a:r>
-              <a:rPr lang="en-US" dirty="0"/>
-              <a:t>linear </a:t>
-            </a:r>
-            <a:r>
-              <a:rPr lang="en-US" dirty="0" smtClean="0"/>
-              <a:t>regressions showed “</a:t>
-            </a:r>
-            <a:r>
-              <a:rPr lang="en-US" dirty="0"/>
-              <a:t>statistically </a:t>
-            </a:r>
-            <a:r>
-              <a:rPr lang="en-US" dirty="0" smtClean="0"/>
-              <a:t>significance”, yet </a:t>
-            </a:r>
-            <a:r>
-              <a:rPr lang="en-US" dirty="0"/>
-              <a:t>were of little practical significance since all coefficients were near zero</a:t>
-            </a:r>
-            <a:r>
-              <a:rPr lang="en-US" dirty="0" smtClean="0"/>
-              <a:t>.</a:t>
-            </a:r>
-          </a:p>
-          <a:p>
-            <a:pPr lvl="2"/>
-            <a:r>
-              <a:rPr lang="en-US" dirty="0"/>
-              <a:t>M</a:t>
-            </a:r>
-            <a:r>
-              <a:rPr lang="en-US" dirty="0" smtClean="0"/>
-              <a:t>ultinomial </a:t>
-            </a:r>
-            <a:r>
-              <a:rPr lang="en-US" dirty="0"/>
-              <a:t>regression favored </a:t>
-            </a:r>
-            <a:r>
-              <a:rPr lang="en-US" dirty="0" smtClean="0"/>
-              <a:t>the Post-1990’s as </a:t>
-            </a:r>
-            <a:r>
-              <a:rPr lang="en-US" dirty="0"/>
-              <a:t>well, wanting to put </a:t>
-            </a:r>
-            <a:r>
-              <a:rPr lang="en-US" dirty="0" smtClean="0"/>
-              <a:t>almost all </a:t>
-            </a:r>
-            <a:r>
-              <a:rPr lang="en-US" dirty="0"/>
-              <a:t>predictions in </a:t>
-            </a:r>
-            <a:r>
-              <a:rPr lang="en-US" dirty="0" smtClean="0"/>
-              <a:t>that </a:t>
-            </a:r>
-            <a:r>
-              <a:rPr lang="en-US" dirty="0"/>
-              <a:t>category with about 80% probability. </a:t>
-            </a:r>
-            <a:endParaRPr lang="en-US" dirty="0"/>
+              <a:rPr lang="en-US" sz="2400" dirty="0"/>
+              <a:t>The model overestimated the year of release for earlier songs (1920 to 1980).</a:t>
+            </a:r>
           </a:p>
         </p:txBody>
       </p:sp>
     </p:spTree>
-    <p:extLst>
-      <p:ext uri="{BB962C8B-B14F-4D97-AF65-F5344CB8AC3E}">
-        <p14:creationId xmlns:p14="http://schemas.microsoft.com/office/powerpoint/2010/main" val="3023372798"/>
-      </p:ext>
-    </p:extLst>
   </p:cSld>
   <p:clrMapOvr>
     <a:masterClrMapping/>
@@ -6910,43 +6963,6 @@
           <a:chExt cx="0" cy="0"/>
         </a:xfrm>
       </p:grpSpPr>
-      <p:pic>
-        <p:nvPicPr>
-          <p:cNvPr id="6" name="Content Placeholder 5" descr="plot_resids.pdf"/>
-          <p:cNvPicPr>
-            <a:picLocks noGrp="1" noChangeAspect="1"/>
-          </p:cNvPicPr>
-          <p:nvPr>
-            <p:ph idx="1"/>
-          </p:nvPr>
-        </p:nvPicPr>
-        <mc:AlternateContent xmlns:mc="http://schemas.openxmlformats.org/markup-compatibility/2006">
-          <mc:Choice xmlns:ma="http://schemas.microsoft.com/office/mac/drawingml/2008/main" xmlns:mv="urn:schemas-microsoft-com:mac:vml" xmlns="" Requires="ma">
-            <p:blipFill>
-              <a:blip r:embed="rId3"/>
-              <a:srcRect l="-2632" r="-2632"/>
-              <a:stretch>
-                <a:fillRect/>
-              </a:stretch>
-            </p:blipFill>
-          </mc:Choice>
-          <mc:Fallback>
-            <p:blipFill>
-              <a:blip r:embed="rId4"/>
-              <a:srcRect l="-2632" r="-2632"/>
-              <a:stretch>
-                <a:fillRect/>
-              </a:stretch>
-            </p:blipFill>
-          </mc:Fallback>
-        </mc:AlternateContent>
-        <p:spPr>
-          <a:xfrm>
-            <a:off x="184484" y="1143000"/>
-            <a:ext cx="8807116" cy="4648200"/>
-          </a:xfrm>
-        </p:spPr>
-      </p:pic>
       <p:sp>
         <p:nvSpPr>
           <p:cNvPr id="2" name="Title 1"/>
@@ -7028,7 +7044,99 @@
           </a:p>
         </p:txBody>
       </p:sp>
+      <p:sp>
+        <p:nvSpPr>
+          <p:cNvPr id="3" name="Content Placeholder 2"/>
+          <p:cNvSpPr>
+            <a:spLocks noGrp="1"/>
+          </p:cNvSpPr>
+          <p:nvPr>
+            <p:ph idx="1"/>
+          </p:nvPr>
+        </p:nvSpPr>
+        <p:spPr/>
+        <p:txBody>
+          <a:bodyPr/>
+          <a:lstStyle/>
+          <a:p>
+            <a:r>
+              <a:rPr lang="en-US" sz="2800" dirty="0" smtClean="0"/>
+              <a:t>All </a:t>
+            </a:r>
+            <a:r>
+              <a:rPr lang="en-US" sz="2800" dirty="0" smtClean="0"/>
+              <a:t>the multiple </a:t>
+            </a:r>
+            <a:r>
+              <a:rPr lang="en-US" sz="2800" dirty="0"/>
+              <a:t>linear </a:t>
+            </a:r>
+            <a:r>
+              <a:rPr lang="en-US" sz="2800" dirty="0" smtClean="0"/>
+              <a:t>regressions showed “</a:t>
+            </a:r>
+            <a:r>
+              <a:rPr lang="en-US" sz="2800" dirty="0"/>
+              <a:t>statistically </a:t>
+            </a:r>
+            <a:r>
+              <a:rPr lang="en-US" sz="2800" dirty="0" smtClean="0"/>
+              <a:t>significance”, yet </a:t>
+            </a:r>
+            <a:r>
+              <a:rPr lang="en-US" sz="2800" dirty="0"/>
+              <a:t>were of little practical significance since all coefficients were near </a:t>
+            </a:r>
+            <a:r>
+              <a:rPr lang="en-US" sz="2800" dirty="0" smtClean="0"/>
+              <a:t>zero.</a:t>
+            </a:r>
+          </a:p>
+          <a:p>
+            <a:endParaRPr lang="en-US" sz="2800" dirty="0" smtClean="0"/>
+          </a:p>
+          <a:p>
+            <a:r>
+              <a:rPr lang="en-US" sz="2800" dirty="0" smtClean="0"/>
+              <a:t>Multinomial </a:t>
+            </a:r>
+            <a:r>
+              <a:rPr lang="en-US" sz="2800" dirty="0"/>
+              <a:t>regression favored </a:t>
+            </a:r>
+            <a:r>
+              <a:rPr lang="en-US" sz="2800" dirty="0" smtClean="0"/>
+              <a:t>the Post-1990’s as </a:t>
+            </a:r>
+            <a:r>
+              <a:rPr lang="en-US" sz="2800" dirty="0"/>
+              <a:t>well, wanting to put </a:t>
+            </a:r>
+            <a:r>
+              <a:rPr lang="en-US" sz="2800" dirty="0" smtClean="0"/>
+              <a:t>almost all </a:t>
+            </a:r>
+            <a:r>
+              <a:rPr lang="en-US" sz="2800" dirty="0"/>
+              <a:t>predictions in </a:t>
+            </a:r>
+            <a:r>
+              <a:rPr lang="en-US" sz="2800" dirty="0" smtClean="0"/>
+              <a:t>that </a:t>
+            </a:r>
+            <a:r>
+              <a:rPr lang="en-US" sz="2800" dirty="0"/>
+              <a:t>category with about 80% probability. </a:t>
+            </a:r>
+          </a:p>
+        </p:txBody>
+      </p:sp>
     </p:spTree>
+    <p:extLst>
+      <p:ext uri="{BB962C8B-B14F-4D97-AF65-F5344CB8AC3E}">
+        <p14:creationId xmlns:p14="http://schemas.microsoft.com/office/powerpoint/2010/main" val="3023372798"/>
+      </p:ext>
+    </p:extLst>
   </p:cSld>
   <p:clrMapOvr>
     <a:masterClrMapping/>
@@ -7077,15 +7185,7 @@
           <a:p>
             <a:r>
               <a:rPr lang="en-US" sz="3200" dirty="0" smtClean="0"/>
-              <a:t>First c</a:t>
-            </a:r>
-            <a:r>
-              <a:rPr lang="en-US" sz="3200" dirty="0" smtClean="0"/>
-              <a:t>onsidered </a:t>
-            </a:r>
-            <a:r>
-              <a:rPr lang="en-US" sz="3200" dirty="0" smtClean="0"/>
-              <a:t>year as continuous variable</a:t>
+              <a:t>First considered year as continuous variable</a:t>
             </a:r>
           </a:p>
           <a:p>
@@ -7291,7 +7391,6 @@
               <a:rPr lang="en-US" sz="3200" dirty="0" smtClean="0"/>
               <a:t>Revealed same number of PCs as full data set (515,345 songs) </a:t>
             </a:r>
-            <a:endParaRPr lang="en-US" sz="3200" dirty="0" smtClean="0"/>
           </a:p>
           <a:p>
             <a:r>
@@ -7608,6 +7707,1424 @@
     <p:extLst>
       <p:ext uri="{BB962C8B-B14F-4D97-AF65-F5344CB8AC3E}">
         <p14:creationId xmlns:p14="http://schemas.microsoft.com/office/powerpoint/2010/main" val="704769989"/>
+      </p:ext>
+    </p:extLst>
+  </p:cSld>
+  <p:clrMapOvr>
+    <a:masterClrMapping/>
+  </p:clrMapOvr>
+  <p:transition>
+    <p:fade/>
+  </p:transition>
+  <p:timing>
+    <p:tnLst>
+      <p:par>
+        <p:cTn id="1" dur="indefinite" restart="never" nodeType="tmRoot"/>
+      </p:par>
+    </p:tnLst>
+  </p:timing>
+</p:sld>
+</file>
+
+<file path=ppt/slides/slide15.xml><?xml version="1.0" encoding="utf-8"?>
+<p:sld xmlns:a="http://schemas.openxmlformats.org/drawingml/2006/main" xmlns:r="http://schemas.openxmlformats.org/officeDocument/2006/relationships" xmlns:p="http://schemas.openxmlformats.org/presentationml/2006/main">
+  <p:cSld>
+    <p:spTree>
+      <p:nvGrpSpPr>
+        <p:cNvPr id="1" name=""/>
+        <p:cNvGrpSpPr/>
+        <p:nvPr/>
+      </p:nvGrpSpPr>
+      <p:grpSpPr>
+        <a:xfrm>
+          <a:off x="0" y="0"/>
+          <a:ext cx="0" cy="0"/>
+          <a:chOff x="0" y="0"/>
+          <a:chExt cx="0" cy="0"/>
+        </a:xfrm>
+      </p:grpSpPr>
+      <p:sp>
+        <p:nvSpPr>
+          <p:cNvPr id="2" name="Date Placeholder 1"/>
+          <p:cNvSpPr>
+            <a:spLocks noGrp="1"/>
+          </p:cNvSpPr>
+          <p:nvPr>
+            <p:ph type="dt" sz="half" idx="10"/>
+          </p:nvPr>
+        </p:nvSpPr>
+        <p:spPr/>
+        <p:txBody>
+          <a:bodyPr/>
+          <a:lstStyle/>
+          <a:p>
+            <a:pPr>
+              <a:defRPr/>
+            </a:pPr>
+            <a:fld id="{38476016-B4D1-4640-A748-346C5607391A}" type="datetime4">
+              <a:rPr lang="en-US" smtClean="0"/>
+              <a:pPr>
+                <a:defRPr/>
+              </a:pPr>
+              <a:t>June 1, 2014</a:t>
+            </a:fld>
+            <a:endParaRPr lang="en-US"/>
+          </a:p>
+        </p:txBody>
+      </p:sp>
+      <p:sp>
+        <p:nvSpPr>
+          <p:cNvPr id="3" name="Slide Number Placeholder 2"/>
+          <p:cNvSpPr>
+            <a:spLocks noGrp="1"/>
+          </p:cNvSpPr>
+          <p:nvPr>
+            <p:ph type="sldNum" sz="quarter" idx="11"/>
+          </p:nvPr>
+        </p:nvSpPr>
+        <p:spPr/>
+        <p:txBody>
+          <a:bodyPr/>
+          <a:lstStyle/>
+          <a:p>
+            <a:pPr>
+              <a:defRPr/>
+            </a:pPr>
+            <a:fld id="{8B8D6C1F-35B7-8B45-AB61-9061F7C69F67}" type="slidenum">
+              <a:rPr lang="en-US" smtClean="0"/>
+              <a:pPr>
+                <a:defRPr/>
+              </a:pPr>
+              <a:t>15</a:t>
+            </a:fld>
+            <a:endParaRPr lang="en-US" dirty="0"/>
+          </a:p>
+        </p:txBody>
+      </p:sp>
+    </p:spTree>
+    <p:extLst>
+      <p:ext uri="{BB962C8B-B14F-4D97-AF65-F5344CB8AC3E}">
+        <p14:creationId xmlns:p14="http://schemas.microsoft.com/office/powerpoint/2010/main" val="2123804440"/>
+      </p:ext>
+    </p:extLst>
+  </p:cSld>
+  <p:clrMapOvr>
+    <a:masterClrMapping/>
+  </p:clrMapOvr>
+  <p:transition>
+    <p:fade/>
+  </p:transition>
+</p:sld>
+</file>
+
+<file path=ppt/slides/slide16.xml><?xml version="1.0" encoding="utf-8"?>
+<p:sld xmlns:a="http://schemas.openxmlformats.org/drawingml/2006/main" xmlns:r="http://schemas.openxmlformats.org/officeDocument/2006/relationships" xmlns:p="http://schemas.openxmlformats.org/presentationml/2006/main">
+  <p:cSld>
+    <p:spTree>
+      <p:nvGrpSpPr>
+        <p:cNvPr id="1" name=""/>
+        <p:cNvGrpSpPr/>
+        <p:nvPr/>
+      </p:nvGrpSpPr>
+      <p:grpSpPr>
+        <a:xfrm>
+          <a:off x="0" y="0"/>
+          <a:ext cx="0" cy="0"/>
+          <a:chOff x="0" y="0"/>
+          <a:chExt cx="0" cy="0"/>
+        </a:xfrm>
+      </p:grpSpPr>
+      <mc:AlternateContent xmlns:mc="http://schemas.openxmlformats.org/markup-compatibility/2006" xmlns:a14="http://schemas.microsoft.com/office/drawing/2010/main">
+        <mc:Choice Requires="a14">
+          <p:sp>
+            <p:nvSpPr>
+              <p:cNvPr id="6" name="Content Placeholder 5"/>
+              <p:cNvSpPr>
+                <a:spLocks noGrp="1"/>
+              </p:cNvSpPr>
+              <p:nvPr>
+                <p:ph idx="1"/>
+              </p:nvPr>
+            </p:nvSpPr>
+            <p:spPr>
+              <a:xfrm>
+                <a:off x="457200" y="1371600"/>
+                <a:ext cx="4005072" cy="838200"/>
+              </a:xfrm>
+            </p:spPr>
+            <p:txBody>
+              <a:bodyPr/>
+              <a:lstStyle/>
+              <a:p>
+                <a14:m>
+                  <m:oMath xmlns:m="http://schemas.openxmlformats.org/officeDocument/2006/math">
+                    <m:sSub>
+                      <m:sSubPr>
+                        <m:ctrlPr>
+                          <a:rPr lang="en-US" i="1">
+                            <a:latin typeface="Cambria Math"/>
+                          </a:rPr>
+                        </m:ctrlPr>
+                      </m:sSubPr>
+                      <m:e>
+                        <m:r>
+                          <a:rPr lang="en-US" i="1">
+                            <a:latin typeface="Cambria Math"/>
+                          </a:rPr>
+                          <m:t>𝑆</m:t>
+                        </m:r>
+                      </m:e>
+                      <m:sub>
+                        <m:r>
+                          <a:rPr lang="en-US" i="1">
+                            <a:latin typeface="Cambria Math"/>
+                          </a:rPr>
+                          <m:t>𝑖𝑛</m:t>
+                        </m:r>
+                      </m:sub>
+                    </m:sSub>
+                    <m:r>
+                      <a:rPr lang="en-US" i="1">
+                        <a:latin typeface="Cambria Math"/>
+                      </a:rPr>
+                      <m:t>= </m:t>
+                    </m:r>
+                    <m:sSub>
+                      <m:sSubPr>
+                        <m:ctrlPr>
+                          <a:rPr lang="en-US" i="1">
+                            <a:latin typeface="Cambria Math"/>
+                          </a:rPr>
+                        </m:ctrlPr>
+                      </m:sSubPr>
+                      <m:e>
+                        <m:r>
+                          <a:rPr lang="en-US" i="1">
+                            <a:latin typeface="Cambria Math"/>
+                          </a:rPr>
+                          <m:t>𝛽</m:t>
+                        </m:r>
+                      </m:e>
+                      <m:sub>
+                        <m:r>
+                          <a:rPr lang="en-US" i="1">
+                            <a:latin typeface="Cambria Math"/>
+                          </a:rPr>
+                          <m:t>𝑖</m:t>
+                        </m:r>
+                      </m:sub>
+                    </m:sSub>
+                    <m:sSub>
+                      <m:sSubPr>
+                        <m:ctrlPr>
+                          <a:rPr lang="en-US" i="1">
+                            <a:latin typeface="Cambria Math"/>
+                          </a:rPr>
+                        </m:ctrlPr>
+                      </m:sSubPr>
+                      <m:e>
+                        <m:r>
+                          <a:rPr lang="en-US" i="1">
+                            <a:latin typeface="Cambria Math"/>
+                          </a:rPr>
+                          <m:t>𝑋</m:t>
+                        </m:r>
+                      </m:e>
+                      <m:sub>
+                        <m:r>
+                          <a:rPr lang="en-US" i="1">
+                            <a:latin typeface="Cambria Math"/>
+                          </a:rPr>
+                          <m:t>𝑖𝑛</m:t>
+                        </m:r>
+                      </m:sub>
+                    </m:sSub>
+                    <m:r>
+                      <a:rPr lang="en-US" i="1">
+                        <a:latin typeface="Cambria Math"/>
+                      </a:rPr>
+                      <m:t>+</m:t>
+                    </m:r>
+                    <m:sSub>
+                      <m:sSubPr>
+                        <m:ctrlPr>
+                          <a:rPr lang="en-US" i="1">
+                            <a:latin typeface="Cambria Math"/>
+                          </a:rPr>
+                        </m:ctrlPr>
+                      </m:sSubPr>
+                      <m:e>
+                        <m:r>
+                          <a:rPr lang="en-US" i="1">
+                            <a:latin typeface="Cambria Math"/>
+                          </a:rPr>
+                          <m:t>𝜀</m:t>
+                        </m:r>
+                      </m:e>
+                      <m:sub>
+                        <m:r>
+                          <a:rPr lang="en-US" i="1">
+                            <a:latin typeface="Cambria Math"/>
+                          </a:rPr>
+                          <m:t>𝑖𝑛</m:t>
+                        </m:r>
+                      </m:sub>
+                    </m:sSub>
+                  </m:oMath>
+                </a14:m>
+                <a:endParaRPr lang="en-US" dirty="0"/>
+              </a:p>
+              <a:p>
+                <a:endParaRPr lang="en-US" dirty="0"/>
+              </a:p>
+            </p:txBody>
+          </p:sp>
+        </mc:Choice>
+        <mc:Fallback xmlns="">
+          <p:sp>
+            <p:nvSpPr>
+              <p:cNvPr id="6" name="Content Placeholder 5"/>
+              <p:cNvSpPr>
+                <a:spLocks noGrp="1" noRot="1" noChangeAspect="1" noMove="1" noResize="1" noEditPoints="1" noAdjustHandles="1" noChangeArrowheads="1" noChangeShapeType="1" noTextEdit="1"/>
+              </p:cNvSpPr>
+              <p:nvPr>
+                <p:ph idx="1"/>
+              </p:nvPr>
+            </p:nvSpPr>
+            <p:spPr>
+              <a:xfrm>
+                <a:off x="457200" y="1371600"/>
+                <a:ext cx="4005072" cy="838200"/>
+              </a:xfrm>
+              <a:blipFill rotWithShape="1">
+                <a:blip r:embed="rId3"/>
+                <a:stretch>
+                  <a:fillRect l="-1979" t="-2899"/>
+                </a:stretch>
+              </a:blipFill>
+            </p:spPr>
+            <p:txBody>
+              <a:bodyPr/>
+              <a:lstStyle/>
+              <a:p>
+                <a:r>
+                  <a:rPr lang="en-US">
+                    <a:noFill/>
+                  </a:rPr>
+                  <a:t> </a:t>
+                </a:r>
+              </a:p>
+            </p:txBody>
+          </p:sp>
+        </mc:Fallback>
+      </mc:AlternateContent>
+      <mc:AlternateContent xmlns:mc="http://schemas.openxmlformats.org/markup-compatibility/2006" xmlns:a14="http://schemas.microsoft.com/office/drawing/2010/main">
+        <mc:Choice Requires="a14">
+          <p:sp>
+            <p:nvSpPr>
+              <p:cNvPr id="7" name="Content Placeholder 6"/>
+              <p:cNvSpPr>
+                <a:spLocks noGrp="1"/>
+              </p:cNvSpPr>
+              <p:nvPr>
+                <p:ph idx="10"/>
+              </p:nvPr>
+            </p:nvSpPr>
+            <p:spPr>
+              <a:xfrm>
+                <a:off x="4690872" y="1371600"/>
+                <a:ext cx="4005072" cy="990600"/>
+              </a:xfrm>
+            </p:spPr>
+            <p:txBody>
+              <a:bodyPr/>
+              <a:lstStyle/>
+              <a:p>
+                <a14:m>
+                  <m:oMath xmlns:m="http://schemas.openxmlformats.org/officeDocument/2006/math">
+                    <m:sSub>
+                      <m:sSubPr>
+                        <m:ctrlPr>
+                          <a:rPr lang="en-US" i="1">
+                            <a:latin typeface="Cambria Math"/>
+                          </a:rPr>
+                        </m:ctrlPr>
+                      </m:sSubPr>
+                      <m:e>
+                        <m:r>
+                          <a:rPr lang="en-US" i="1">
+                            <a:latin typeface="Cambria Math"/>
+                          </a:rPr>
+                          <m:t>𝑃</m:t>
+                        </m:r>
+                      </m:e>
+                      <m:sub>
+                        <m:r>
+                          <a:rPr lang="en-US" i="1">
+                            <a:latin typeface="Cambria Math"/>
+                          </a:rPr>
+                          <m:t>𝑛</m:t>
+                        </m:r>
+                      </m:sub>
+                    </m:sSub>
+                    <m:d>
+                      <m:dPr>
+                        <m:ctrlPr>
+                          <a:rPr lang="en-US" i="1">
+                            <a:latin typeface="Cambria Math"/>
+                          </a:rPr>
+                        </m:ctrlPr>
+                      </m:dPr>
+                      <m:e>
+                        <m:r>
+                          <a:rPr lang="en-US" i="1">
+                            <a:latin typeface="Cambria Math"/>
+                          </a:rPr>
+                          <m:t>𝑖</m:t>
+                        </m:r>
+                      </m:e>
+                    </m:d>
+                    <m:r>
+                      <a:rPr lang="en-US" i="1">
+                        <a:latin typeface="Cambria Math"/>
+                      </a:rPr>
+                      <m:t>=</m:t>
+                    </m:r>
+                    <m:f>
+                      <m:fPr>
+                        <m:ctrlPr>
+                          <a:rPr lang="en-US" i="1">
+                            <a:latin typeface="Cambria Math"/>
+                          </a:rPr>
+                        </m:ctrlPr>
+                      </m:fPr>
+                      <m:num>
+                        <m:r>
+                          <a:rPr lang="en-US" i="1">
+                            <a:latin typeface="Cambria Math"/>
+                          </a:rPr>
+                          <m:t>𝐸𝑋𝑃</m:t>
+                        </m:r>
+                        <m:r>
+                          <a:rPr lang="en-US" i="1">
+                            <a:latin typeface="Cambria Math"/>
+                          </a:rPr>
+                          <m:t>[</m:t>
+                        </m:r>
+                        <m:sSub>
+                          <m:sSubPr>
+                            <m:ctrlPr>
+                              <a:rPr lang="en-US" i="1">
+                                <a:latin typeface="Cambria Math"/>
+                              </a:rPr>
+                            </m:ctrlPr>
+                          </m:sSubPr>
+                          <m:e>
+                            <m:r>
+                              <a:rPr lang="en-US" i="1">
+                                <a:latin typeface="Cambria Math"/>
+                              </a:rPr>
+                              <m:t>𝛽</m:t>
+                            </m:r>
+                          </m:e>
+                          <m:sub>
+                            <m:r>
+                              <a:rPr lang="en-US" i="1">
+                                <a:latin typeface="Cambria Math"/>
+                              </a:rPr>
+                              <m:t>𝑖</m:t>
+                            </m:r>
+                          </m:sub>
+                        </m:sSub>
+                        <m:sSub>
+                          <m:sSubPr>
+                            <m:ctrlPr>
+                              <a:rPr lang="en-US" i="1">
+                                <a:latin typeface="Cambria Math"/>
+                              </a:rPr>
+                            </m:ctrlPr>
+                          </m:sSubPr>
+                          <m:e>
+                            <m:r>
+                              <a:rPr lang="en-US" i="1">
+                                <a:latin typeface="Cambria Math"/>
+                              </a:rPr>
+                              <m:t>𝑋</m:t>
+                            </m:r>
+                          </m:e>
+                          <m:sub>
+                            <m:r>
+                              <a:rPr lang="en-US" i="1">
+                                <a:latin typeface="Cambria Math"/>
+                              </a:rPr>
+                              <m:t>𝑖𝑛</m:t>
+                            </m:r>
+                          </m:sub>
+                        </m:sSub>
+                        <m:r>
+                          <a:rPr lang="en-US" i="1">
+                            <a:latin typeface="Cambria Math"/>
+                          </a:rPr>
+                          <m:t>]</m:t>
+                        </m:r>
+                      </m:num>
+                      <m:den>
+                        <m:nary>
+                          <m:naryPr>
+                            <m:chr m:val="∑"/>
+                            <m:limLoc m:val="undOvr"/>
+                            <m:supHide m:val="on"/>
+                            <m:ctrlPr>
+                              <a:rPr lang="en-US" i="1">
+                                <a:latin typeface="Cambria Math"/>
+                              </a:rPr>
+                            </m:ctrlPr>
+                          </m:naryPr>
+                          <m:sub>
+                            <m:r>
+                              <a:rPr lang="en-US" i="1">
+                                <a:latin typeface="Cambria Math"/>
+                              </a:rPr>
+                              <m:t>∀</m:t>
+                            </m:r>
+                            <m:r>
+                              <a:rPr lang="en-US" i="1">
+                                <a:latin typeface="Cambria Math"/>
+                              </a:rPr>
+                              <m:t>𝐼</m:t>
+                            </m:r>
+                          </m:sub>
+                          <m:sup/>
+                          <m:e>
+                            <m:r>
+                              <a:rPr lang="en-US" i="1">
+                                <a:latin typeface="Cambria Math"/>
+                              </a:rPr>
+                              <m:t>𝐸𝑋𝑃</m:t>
+                            </m:r>
+                            <m:r>
+                              <a:rPr lang="en-US" i="1">
+                                <a:latin typeface="Cambria Math"/>
+                              </a:rPr>
+                              <m:t>(</m:t>
+                            </m:r>
+                            <m:sSub>
+                              <m:sSubPr>
+                                <m:ctrlPr>
+                                  <a:rPr lang="en-US" i="1">
+                                    <a:latin typeface="Cambria Math"/>
+                                  </a:rPr>
+                                </m:ctrlPr>
+                              </m:sSubPr>
+                              <m:e>
+                                <m:r>
+                                  <a:rPr lang="en-US" i="1">
+                                    <a:latin typeface="Cambria Math"/>
+                                  </a:rPr>
+                                  <m:t>𝛽</m:t>
+                                </m:r>
+                              </m:e>
+                              <m:sub>
+                                <m:r>
+                                  <a:rPr lang="en-US" i="1">
+                                    <a:latin typeface="Cambria Math"/>
+                                  </a:rPr>
+                                  <m:t>𝐼</m:t>
+                                </m:r>
+                              </m:sub>
+                            </m:sSub>
+                            <m:sSub>
+                              <m:sSubPr>
+                                <m:ctrlPr>
+                                  <a:rPr lang="en-US" i="1">
+                                    <a:latin typeface="Cambria Math"/>
+                                  </a:rPr>
+                                </m:ctrlPr>
+                              </m:sSubPr>
+                              <m:e>
+                                <m:r>
+                                  <a:rPr lang="en-US" i="1">
+                                    <a:latin typeface="Cambria Math"/>
+                                  </a:rPr>
+                                  <m:t>𝑋</m:t>
+                                </m:r>
+                              </m:e>
+                              <m:sub>
+                                <m:r>
+                                  <a:rPr lang="en-US" i="1">
+                                    <a:latin typeface="Cambria Math"/>
+                                  </a:rPr>
+                                  <m:t>𝐼𝑛</m:t>
+                                </m:r>
+                              </m:sub>
+                            </m:sSub>
+                            <m:r>
+                              <a:rPr lang="en-US" i="1">
+                                <a:latin typeface="Cambria Math"/>
+                              </a:rPr>
+                              <m:t>)]</m:t>
+                            </m:r>
+                          </m:e>
+                        </m:nary>
+                      </m:den>
+                    </m:f>
+                  </m:oMath>
+                </a14:m>
+                <a:endParaRPr lang="en-US" dirty="0"/>
+              </a:p>
+              <a:p>
+                <a:endParaRPr lang="en-US" dirty="0"/>
+              </a:p>
+            </p:txBody>
+          </p:sp>
+        </mc:Choice>
+        <mc:Fallback xmlns="">
+          <p:sp>
+            <p:nvSpPr>
+              <p:cNvPr id="7" name="Content Placeholder 6"/>
+              <p:cNvSpPr>
+                <a:spLocks noGrp="1" noRot="1" noChangeAspect="1" noMove="1" noResize="1" noEditPoints="1" noAdjustHandles="1" noChangeArrowheads="1" noChangeShapeType="1" noTextEdit="1"/>
+              </p:cNvSpPr>
+              <p:nvPr>
+                <p:ph idx="10"/>
+              </p:nvPr>
+            </p:nvSpPr>
+            <p:spPr>
+              <a:xfrm>
+                <a:off x="4690872" y="1371600"/>
+                <a:ext cx="4005072" cy="990600"/>
+              </a:xfrm>
+              <a:blipFill rotWithShape="1">
+                <a:blip r:embed="rId4"/>
+                <a:stretch>
+                  <a:fillRect/>
+                </a:stretch>
+              </a:blipFill>
+            </p:spPr>
+            <p:txBody>
+              <a:bodyPr/>
+              <a:lstStyle/>
+              <a:p>
+                <a:r>
+                  <a:rPr lang="en-US">
+                    <a:noFill/>
+                  </a:rPr>
+                  <a:t> </a:t>
+                </a:r>
+              </a:p>
+            </p:txBody>
+          </p:sp>
+        </mc:Fallback>
+      </mc:AlternateContent>
+      <p:sp>
+        <p:nvSpPr>
+          <p:cNvPr id="2" name="Title 1"/>
+          <p:cNvSpPr>
+            <a:spLocks noGrp="1"/>
+          </p:cNvSpPr>
+          <p:nvPr>
+            <p:ph type="title"/>
+          </p:nvPr>
+        </p:nvSpPr>
+        <p:spPr/>
+        <p:txBody>
+          <a:bodyPr/>
+          <a:lstStyle/>
+          <a:p>
+            <a:r>
+              <a:rPr lang="en-US" sz="2800" dirty="0" smtClean="0"/>
+              <a:t>Discrete Choice Model – Multinomial </a:t>
+            </a:r>
+            <a:r>
+              <a:rPr lang="en-US" sz="2800" dirty="0" err="1" smtClean="0"/>
+              <a:t>Logit</a:t>
+            </a:r>
+            <a:r>
+              <a:rPr lang="en-US" sz="2800" dirty="0" smtClean="0"/>
+              <a:t> Model</a:t>
+            </a:r>
+            <a:endParaRPr lang="en-US" sz="2800" dirty="0"/>
+          </a:p>
+        </p:txBody>
+      </p:sp>
+      <p:sp>
+        <p:nvSpPr>
+          <p:cNvPr id="4" name="Date Placeholder 3"/>
+          <p:cNvSpPr>
+            <a:spLocks noGrp="1"/>
+          </p:cNvSpPr>
+          <p:nvPr>
+            <p:ph type="dt" sz="half" idx="11"/>
+          </p:nvPr>
+        </p:nvSpPr>
+        <p:spPr/>
+        <p:txBody>
+          <a:bodyPr/>
+          <a:lstStyle/>
+          <a:p>
+            <a:pPr>
+              <a:defRPr/>
+            </a:pPr>
+            <a:r>
+              <a:rPr lang="en-US" dirty="0" smtClean="0"/>
+              <a:t>June 2, 2014</a:t>
+            </a:r>
+            <a:endParaRPr lang="en-US" dirty="0"/>
+          </a:p>
+        </p:txBody>
+      </p:sp>
+      <p:sp>
+        <p:nvSpPr>
+          <p:cNvPr id="5" name="Slide Number Placeholder 4"/>
+          <p:cNvSpPr>
+            <a:spLocks noGrp="1"/>
+          </p:cNvSpPr>
+          <p:nvPr>
+            <p:ph type="sldNum" sz="quarter" idx="12"/>
+          </p:nvPr>
+        </p:nvSpPr>
+        <p:spPr/>
+        <p:txBody>
+          <a:bodyPr/>
+          <a:lstStyle/>
+          <a:p>
+            <a:pPr>
+              <a:defRPr/>
+            </a:pPr>
+            <a:fld id="{8A8258B9-01E1-BA41-A991-9A187DF9FB72}" type="slidenum">
+              <a:rPr lang="en-US" smtClean="0"/>
+              <a:pPr>
+                <a:defRPr/>
+              </a:pPr>
+              <a:t>16</a:t>
+            </a:fld>
+            <a:endParaRPr lang="en-US"/>
+          </a:p>
+        </p:txBody>
+      </p:sp>
+      <mc:AlternateContent xmlns:mc="http://schemas.openxmlformats.org/markup-compatibility/2006" xmlns:a14="http://schemas.microsoft.com/office/drawing/2010/main">
+        <mc:Choice Requires="a14">
+          <p:graphicFrame>
+            <p:nvGraphicFramePr>
+              <p:cNvPr id="8" name="Table 7"/>
+              <p:cNvGraphicFramePr>
+                <a:graphicFrameLocks noGrp="1"/>
+              </p:cNvGraphicFramePr>
+              <p:nvPr>
+                <p:extLst>
+                  <p:ext uri="{D42A27DB-BD31-4B8C-83A1-F6EECF244321}">
+                    <p14:modId xmlns:p14="http://schemas.microsoft.com/office/powerpoint/2010/main" val="3308873318"/>
+                  </p:ext>
+                </p:extLst>
+              </p:nvPr>
+            </p:nvGraphicFramePr>
+            <p:xfrm>
+              <a:off x="533400" y="2362200"/>
+              <a:ext cx="7848600" cy="2987040"/>
+            </p:xfrm>
+            <a:graphic>
+              <a:graphicData uri="http://schemas.openxmlformats.org/drawingml/2006/table">
+                <a:tbl>
+                  <a:tblPr firstRow="1" bandRow="1">
+                    <a:tableStyleId>{5C22544A-7EE6-4342-B048-85BDC9FD1C3A}</a:tableStyleId>
+                  </a:tblPr>
+                  <a:tblGrid>
+                    <a:gridCol w="1143000"/>
+                    <a:gridCol w="6705600"/>
+                  </a:tblGrid>
+                  <a:tr h="370840">
+                    <a:tc>
+                      <a:txBody>
+                        <a:bodyPr/>
+                        <a:lstStyle/>
+                        <a:p>
+                          <a:r>
+                            <a:rPr lang="en-US" sz="2000" dirty="0" smtClean="0">
+                              <a:latin typeface="Calibri" panose="020F0502020204030204" pitchFamily="34" charset="0"/>
+                            </a:rPr>
+                            <a:t>Variable </a:t>
+                          </a:r>
+                          <a:endParaRPr lang="en-US" sz="2000" dirty="0">
+                            <a:latin typeface="Calibri" panose="020F0502020204030204" pitchFamily="34" charset="0"/>
+                          </a:endParaRPr>
+                        </a:p>
+                      </a:txBody>
+                      <a:tcPr/>
+                    </a:tc>
+                    <a:tc>
+                      <a:txBody>
+                        <a:bodyPr/>
+                        <a:lstStyle/>
+                        <a:p>
+                          <a:r>
+                            <a:rPr lang="en-US" sz="2000" dirty="0" smtClean="0">
+                              <a:latin typeface="Calibri" panose="020F0502020204030204" pitchFamily="34" charset="0"/>
+                            </a:rPr>
+                            <a:t>Description </a:t>
+                          </a:r>
+                          <a:endParaRPr lang="en-US" sz="2000" dirty="0">
+                            <a:latin typeface="Calibri" panose="020F0502020204030204" pitchFamily="34" charset="0"/>
+                          </a:endParaRPr>
+                        </a:p>
+                      </a:txBody>
+                      <a:tcPr/>
+                    </a:tc>
+                  </a:tr>
+                  <a:tr h="370840">
+                    <a:tc>
+                      <a:txBody>
+                        <a:bodyPr/>
+                        <a:lstStyle/>
+                        <a:p>
+                          <a:pPr/>
+                          <a14:m>
+                            <m:oMathPara xmlns:m="http://schemas.openxmlformats.org/officeDocument/2006/math">
+                              <m:oMathParaPr>
+                                <m:jc m:val="centerGroup"/>
+                              </m:oMathParaPr>
+                              <m:oMath xmlns:m="http://schemas.openxmlformats.org/officeDocument/2006/math">
+                                <m:sSub>
+                                  <m:sSubPr>
+                                    <m:ctrlPr>
+                                      <a:rPr lang="en-US" sz="2000" i="1" smtClean="0">
+                                        <a:latin typeface="Cambria Math"/>
+                                      </a:rPr>
+                                    </m:ctrlPr>
+                                  </m:sSubPr>
+                                  <m:e>
+                                    <m:r>
+                                      <a:rPr lang="en-US" sz="2000" i="1">
+                                        <a:latin typeface="Cambria Math"/>
+                                      </a:rPr>
+                                      <m:t>𝑆</m:t>
+                                    </m:r>
+                                  </m:e>
+                                  <m:sub>
+                                    <m:r>
+                                      <a:rPr lang="en-US" sz="2000" i="1">
+                                        <a:latin typeface="Cambria Math"/>
+                                      </a:rPr>
+                                      <m:t>𝑖𝑛</m:t>
+                                    </m:r>
+                                  </m:sub>
+                                </m:sSub>
+                              </m:oMath>
+                            </m:oMathPara>
+                          </a14:m>
+                          <a:endParaRPr lang="en-US" sz="2000" dirty="0">
+                            <a:latin typeface="Calibri" panose="020F0502020204030204" pitchFamily="34" charset="0"/>
+                          </a:endParaRPr>
+                        </a:p>
+                      </a:txBody>
+                      <a:tcPr/>
+                    </a:tc>
+                    <a:tc>
+                      <a:txBody>
+                        <a:bodyPr/>
+                        <a:lstStyle/>
+                        <a:p>
+                          <a:r>
+                            <a:rPr lang="en-US" sz="2000" dirty="0" smtClean="0">
+                              <a:latin typeface="Calibri" panose="020F0502020204030204" pitchFamily="34" charset="0"/>
+                            </a:rPr>
+                            <a:t>The function</a:t>
+                          </a:r>
+                          <a:r>
+                            <a:rPr lang="en-US" sz="2000" baseline="0" dirty="0" smtClean="0">
+                              <a:latin typeface="Calibri" panose="020F0502020204030204" pitchFamily="34" charset="0"/>
+                            </a:rPr>
+                            <a:t> determining injury outcome</a:t>
+                          </a:r>
+                          <a:endParaRPr lang="en-US" sz="2000" dirty="0">
+                            <a:latin typeface="Calibri" panose="020F0502020204030204" pitchFamily="34" charset="0"/>
+                          </a:endParaRPr>
+                        </a:p>
+                      </a:txBody>
+                      <a:tcPr/>
+                    </a:tc>
+                  </a:tr>
+                  <a:tr h="370840">
+                    <a:tc>
+                      <a:txBody>
+                        <a:bodyPr/>
+                        <a:lstStyle/>
+                        <a:p>
+                          <a:pPr/>
+                          <a14:m>
+                            <m:oMathPara xmlns:m="http://schemas.openxmlformats.org/officeDocument/2006/math">
+                              <m:oMathParaPr>
+                                <m:jc m:val="centerGroup"/>
+                              </m:oMathParaPr>
+                              <m:oMath xmlns:m="http://schemas.openxmlformats.org/officeDocument/2006/math">
+                                <m:sSub>
+                                  <m:sSubPr>
+                                    <m:ctrlPr>
+                                      <a:rPr lang="en-US" sz="2000" i="1" smtClean="0">
+                                        <a:latin typeface="Cambria Math"/>
+                                      </a:rPr>
+                                    </m:ctrlPr>
+                                  </m:sSubPr>
+                                  <m:e>
+                                    <m:r>
+                                      <a:rPr lang="en-US" sz="2000" i="1">
+                                        <a:latin typeface="Cambria Math"/>
+                                      </a:rPr>
+                                      <m:t>𝑋</m:t>
+                                    </m:r>
+                                  </m:e>
+                                  <m:sub>
+                                    <m:r>
+                                      <a:rPr lang="en-US" sz="2000" i="1">
+                                        <a:latin typeface="Cambria Math"/>
+                                      </a:rPr>
+                                      <m:t>𝑖𝑛</m:t>
+                                    </m:r>
+                                  </m:sub>
+                                </m:sSub>
+                              </m:oMath>
+                            </m:oMathPara>
+                          </a14:m>
+                          <a:endParaRPr lang="en-US" sz="2000" dirty="0">
+                            <a:latin typeface="Calibri" panose="020F0502020204030204" pitchFamily="34" charset="0"/>
+                          </a:endParaRPr>
+                        </a:p>
+                      </a:txBody>
+                      <a:tcPr/>
+                    </a:tc>
+                    <a:tc>
+                      <a:txBody>
+                        <a:bodyPr/>
+                        <a:lstStyle/>
+                        <a:p>
+                          <a:r>
+                            <a:rPr lang="en-US" sz="2000" dirty="0" smtClean="0">
+                              <a:latin typeface="Calibri" panose="020F0502020204030204" pitchFamily="34" charset="0"/>
+                            </a:rPr>
+                            <a:t>The vector of explanatory variables</a:t>
+                          </a:r>
+                          <a:endParaRPr lang="en-US" sz="2000" dirty="0">
+                            <a:latin typeface="Calibri" panose="020F0502020204030204" pitchFamily="34" charset="0"/>
+                          </a:endParaRPr>
+                        </a:p>
+                      </a:txBody>
+                      <a:tcPr/>
+                    </a:tc>
+                  </a:tr>
+                  <a:tr h="370840">
+                    <a:tc>
+                      <a:txBody>
+                        <a:bodyPr/>
+                        <a:lstStyle/>
+                        <a:p>
+                          <a:pPr/>
+                          <a14:m>
+                            <m:oMathPara xmlns:m="http://schemas.openxmlformats.org/officeDocument/2006/math">
+                              <m:oMathParaPr>
+                                <m:jc m:val="centerGroup"/>
+                              </m:oMathParaPr>
+                              <m:oMath xmlns:m="http://schemas.openxmlformats.org/officeDocument/2006/math">
+                                <m:sSub>
+                                  <m:sSubPr>
+                                    <m:ctrlPr>
+                                      <a:rPr lang="en-US" sz="2000" i="1" smtClean="0">
+                                        <a:latin typeface="Cambria Math"/>
+                                      </a:rPr>
+                                    </m:ctrlPr>
+                                  </m:sSubPr>
+                                  <m:e>
+                                    <m:r>
+                                      <a:rPr lang="en-US" sz="2000" i="1">
+                                        <a:latin typeface="Cambria Math"/>
+                                      </a:rPr>
+                                      <m:t>𝛽</m:t>
+                                    </m:r>
+                                  </m:e>
+                                  <m:sub>
+                                    <m:r>
+                                      <a:rPr lang="en-US" sz="2000" i="1">
+                                        <a:latin typeface="Cambria Math"/>
+                                      </a:rPr>
+                                      <m:t>𝑖</m:t>
+                                    </m:r>
+                                  </m:sub>
+                                </m:sSub>
+                              </m:oMath>
+                            </m:oMathPara>
+                          </a14:m>
+                          <a:endParaRPr lang="en-US" sz="2000" dirty="0">
+                            <a:latin typeface="Calibri" panose="020F0502020204030204" pitchFamily="34" charset="0"/>
+                          </a:endParaRPr>
+                        </a:p>
+                      </a:txBody>
+                      <a:tcPr/>
+                    </a:tc>
+                    <a:tc>
+                      <a:txBody>
+                        <a:bodyPr/>
+                        <a:lstStyle/>
+                        <a:p>
+                          <a:r>
+                            <a:rPr lang="en-US" sz="2000" dirty="0" smtClean="0">
+                              <a:latin typeface="Calibri" panose="020F0502020204030204" pitchFamily="34" charset="0"/>
+                            </a:rPr>
+                            <a:t>The vector</a:t>
+                          </a:r>
+                          <a:r>
+                            <a:rPr lang="en-US" sz="2000" baseline="0" dirty="0" smtClean="0">
+                              <a:latin typeface="Calibri" panose="020F0502020204030204" pitchFamily="34" charset="0"/>
+                            </a:rPr>
+                            <a:t> of estimate parameters for each explanatory variable</a:t>
+                          </a:r>
+                          <a:endParaRPr lang="en-US" sz="2000" dirty="0">
+                            <a:latin typeface="Calibri" panose="020F0502020204030204" pitchFamily="34" charset="0"/>
+                          </a:endParaRPr>
+                        </a:p>
+                      </a:txBody>
+                      <a:tcPr/>
+                    </a:tc>
+                  </a:tr>
+                  <a:tr h="370840">
+                    <a:tc>
+                      <a:txBody>
+                        <a:bodyPr/>
+                        <a:lstStyle/>
+                        <a:p>
+                          <a:pPr/>
+                          <a14:m>
+                            <m:oMathPara xmlns:m="http://schemas.openxmlformats.org/officeDocument/2006/math">
+                              <m:oMathParaPr>
+                                <m:jc m:val="centerGroup"/>
+                              </m:oMathParaPr>
+                              <m:oMath xmlns:m="http://schemas.openxmlformats.org/officeDocument/2006/math">
+                                <m:sSub>
+                                  <m:sSubPr>
+                                    <m:ctrlPr>
+                                      <a:rPr lang="en-US" sz="2000" i="1" smtClean="0">
+                                        <a:latin typeface="Cambria Math"/>
+                                      </a:rPr>
+                                    </m:ctrlPr>
+                                  </m:sSubPr>
+                                  <m:e>
+                                    <m:r>
+                                      <a:rPr lang="en-US" sz="2000" i="1">
+                                        <a:latin typeface="Cambria Math"/>
+                                      </a:rPr>
+                                      <m:t>𝜀</m:t>
+                                    </m:r>
+                                  </m:e>
+                                  <m:sub>
+                                    <m:r>
+                                      <a:rPr lang="en-US" sz="2000" i="1">
+                                        <a:latin typeface="Cambria Math"/>
+                                      </a:rPr>
+                                      <m:t>𝑖𝑛</m:t>
+                                    </m:r>
+                                  </m:sub>
+                                </m:sSub>
+                              </m:oMath>
+                            </m:oMathPara>
+                          </a14:m>
+                          <a:endParaRPr lang="en-US" sz="2000" dirty="0">
+                            <a:latin typeface="Calibri" panose="020F0502020204030204" pitchFamily="34" charset="0"/>
+                          </a:endParaRPr>
+                        </a:p>
+                      </a:txBody>
+                      <a:tcPr/>
+                    </a:tc>
+                    <a:tc>
+                      <a:txBody>
+                        <a:bodyPr/>
+                        <a:lstStyle/>
+                        <a:p>
+                          <a:r>
+                            <a:rPr lang="en-US" sz="2000" dirty="0" smtClean="0">
+                              <a:latin typeface="Calibri" panose="020F0502020204030204" pitchFamily="34" charset="0"/>
+                            </a:rPr>
+                            <a:t>Error term</a:t>
+                          </a:r>
+                          <a:endParaRPr lang="en-US" sz="2000" dirty="0">
+                            <a:latin typeface="Calibri" panose="020F0502020204030204" pitchFamily="34" charset="0"/>
+                          </a:endParaRPr>
+                        </a:p>
+                      </a:txBody>
+                      <a:tcPr/>
+                    </a:tc>
+                  </a:tr>
+                  <a:tr h="370840">
+                    <a:tc>
+                      <a:txBody>
+                        <a:bodyPr/>
+                        <a:lstStyle/>
+                        <a:p>
+                          <a:pPr/>
+                          <a14:m>
+                            <m:oMathPara xmlns:m="http://schemas.openxmlformats.org/officeDocument/2006/math">
+                              <m:oMathParaPr>
+                                <m:jc m:val="centerGroup"/>
+                              </m:oMathParaPr>
+                              <m:oMath xmlns:m="http://schemas.openxmlformats.org/officeDocument/2006/math">
+                                <m:sSub>
+                                  <m:sSubPr>
+                                    <m:ctrlPr>
+                                      <a:rPr lang="en-US" sz="2000" i="1" smtClean="0">
+                                        <a:latin typeface="Cambria Math"/>
+                                      </a:rPr>
+                                    </m:ctrlPr>
+                                  </m:sSubPr>
+                                  <m:e>
+                                    <m:r>
+                                      <a:rPr lang="en-US" sz="2000" i="1">
+                                        <a:latin typeface="Cambria Math"/>
+                                      </a:rPr>
+                                      <m:t>𝑃</m:t>
+                                    </m:r>
+                                  </m:e>
+                                  <m:sub>
+                                    <m:r>
+                                      <a:rPr lang="en-US" sz="2000" i="1">
+                                        <a:latin typeface="Cambria Math"/>
+                                      </a:rPr>
+                                      <m:t>𝑛</m:t>
+                                    </m:r>
+                                  </m:sub>
+                                </m:sSub>
+                                <m:d>
+                                  <m:dPr>
+                                    <m:ctrlPr>
+                                      <a:rPr lang="en-US" sz="2000" i="1">
+                                        <a:latin typeface="Cambria Math"/>
+                                      </a:rPr>
+                                    </m:ctrlPr>
+                                  </m:dPr>
+                                  <m:e>
+                                    <m:r>
+                                      <a:rPr lang="en-US" sz="2000" i="1">
+                                        <a:latin typeface="Cambria Math"/>
+                                      </a:rPr>
+                                      <m:t>𝑖</m:t>
+                                    </m:r>
+                                  </m:e>
+                                </m:d>
+                              </m:oMath>
+                            </m:oMathPara>
+                          </a14:m>
+                          <a:endParaRPr lang="en-US" sz="2000" dirty="0">
+                            <a:latin typeface="Calibri" panose="020F0502020204030204" pitchFamily="34" charset="0"/>
+                          </a:endParaRPr>
+                        </a:p>
+                      </a:txBody>
+                      <a:tcPr/>
+                    </a:tc>
+                    <a:tc>
+                      <a:txBody>
+                        <a:bodyPr/>
+                        <a:lstStyle/>
+                        <a:p>
+                          <a:r>
+                            <a:rPr lang="en-US" sz="2000" dirty="0" smtClean="0">
+                              <a:latin typeface="Calibri" panose="020F0502020204030204" pitchFamily="34" charset="0"/>
+                            </a:rPr>
+                            <a:t>The probability</a:t>
+                          </a:r>
+                          <a:r>
+                            <a:rPr lang="en-US" sz="2000" baseline="0" dirty="0" smtClean="0">
+                              <a:latin typeface="Calibri" panose="020F0502020204030204" pitchFamily="34" charset="0"/>
+                            </a:rPr>
+                            <a:t> of a large truck-involved crash (n) having a injury outcome </a:t>
+                          </a:r>
+                          <a:endParaRPr lang="en-US" sz="2000" dirty="0">
+                            <a:latin typeface="Calibri" panose="020F0502020204030204" pitchFamily="34" charset="0"/>
+                          </a:endParaRPr>
+                        </a:p>
+                      </a:txBody>
+                      <a:tcPr/>
+                    </a:tc>
+                  </a:tr>
+                </a:tbl>
+              </a:graphicData>
+            </a:graphic>
+          </p:graphicFrame>
+        </mc:Choice>
+        <mc:Fallback xmlns="">
+          <p:graphicFrame>
+            <p:nvGraphicFramePr>
+              <p:cNvPr id="8" name="Table 7"/>
+              <p:cNvGraphicFramePr>
+                <a:graphicFrameLocks noGrp="1"/>
+              </p:cNvGraphicFramePr>
+              <p:nvPr>
+                <p:extLst>
+                  <p:ext uri="{D42A27DB-BD31-4B8C-83A1-F6EECF244321}">
+                    <p14:modId xmlns:p14="http://schemas.microsoft.com/office/powerpoint/2010/main" val="1741937780"/>
+                  </p:ext>
+                </p:extLst>
+              </p:nvPr>
+            </p:nvGraphicFramePr>
+            <p:xfrm>
+              <a:off x="533400" y="2362200"/>
+              <a:ext cx="7848600" cy="2987040"/>
+            </p:xfrm>
+            <a:graphic>
+              <a:graphicData uri="http://schemas.openxmlformats.org/drawingml/2006/table">
+                <a:tbl>
+                  <a:tblPr firstRow="1" bandRow="1">
+                    <a:tableStyleId>{5C22544A-7EE6-4342-B048-85BDC9FD1C3A}</a:tableStyleId>
+                  </a:tblPr>
+                  <a:tblGrid>
+                    <a:gridCol w="1143000"/>
+                    <a:gridCol w="6705600"/>
+                  </a:tblGrid>
+                  <a:tr h="396240">
+                    <a:tc>
+                      <a:txBody>
+                        <a:bodyPr/>
+                        <a:lstStyle/>
+                        <a:p>
+                          <a:r>
+                            <a:rPr lang="en-US" sz="2000" dirty="0" smtClean="0">
+                              <a:latin typeface="Calibri" panose="020F0502020204030204" pitchFamily="34" charset="0"/>
+                            </a:rPr>
+                            <a:t>Variable </a:t>
+                          </a:r>
+                          <a:endParaRPr lang="en-US" sz="2000" dirty="0">
+                            <a:latin typeface="Calibri" panose="020F0502020204030204" pitchFamily="34" charset="0"/>
+                          </a:endParaRPr>
+                        </a:p>
+                      </a:txBody>
+                      <a:tcPr/>
+                    </a:tc>
+                    <a:tc>
+                      <a:txBody>
+                        <a:bodyPr/>
+                        <a:lstStyle/>
+                        <a:p>
+                          <a:r>
+                            <a:rPr lang="en-US" sz="2000" dirty="0" smtClean="0">
+                              <a:latin typeface="Calibri" panose="020F0502020204030204" pitchFamily="34" charset="0"/>
+                            </a:rPr>
+                            <a:t>Description </a:t>
+                          </a:r>
+                          <a:endParaRPr lang="en-US" sz="2000" dirty="0">
+                            <a:latin typeface="Calibri" panose="020F0502020204030204" pitchFamily="34" charset="0"/>
+                          </a:endParaRPr>
+                        </a:p>
+                      </a:txBody>
+                      <a:tcPr/>
+                    </a:tc>
+                  </a:tr>
+                  <a:tr h="396240">
+                    <a:tc>
+                      <a:txBody>
+                        <a:bodyPr/>
+                        <a:lstStyle/>
+                        <a:p>
+                          <a:endParaRPr lang="en-US"/>
+                        </a:p>
+                      </a:txBody>
+                      <a:tcPr>
+                        <a:blipFill rotWithShape="1">
+                          <a:blip r:embed="rId5"/>
+                          <a:stretch>
+                            <a:fillRect l="-535" t="-107692" r="-588235" b="-580000"/>
+                          </a:stretch>
+                        </a:blipFill>
+                      </a:tcPr>
+                    </a:tc>
+                    <a:tc>
+                      <a:txBody>
+                        <a:bodyPr/>
+                        <a:lstStyle/>
+                        <a:p>
+                          <a:r>
+                            <a:rPr lang="en-US" sz="2000" dirty="0" smtClean="0">
+                              <a:latin typeface="Calibri" panose="020F0502020204030204" pitchFamily="34" charset="0"/>
+                            </a:rPr>
+                            <a:t>The function</a:t>
+                          </a:r>
+                          <a:r>
+                            <a:rPr lang="en-US" sz="2000" baseline="0" dirty="0" smtClean="0">
+                              <a:latin typeface="Calibri" panose="020F0502020204030204" pitchFamily="34" charset="0"/>
+                            </a:rPr>
+                            <a:t> determining injury outcome</a:t>
+                          </a:r>
+                          <a:endParaRPr lang="en-US" sz="2000" dirty="0">
+                            <a:latin typeface="Calibri" panose="020F0502020204030204" pitchFamily="34" charset="0"/>
+                          </a:endParaRPr>
+                        </a:p>
+                      </a:txBody>
+                      <a:tcPr/>
+                    </a:tc>
+                  </a:tr>
+                  <a:tr h="396240">
+                    <a:tc>
+                      <a:txBody>
+                        <a:bodyPr/>
+                        <a:lstStyle/>
+                        <a:p>
+                          <a:endParaRPr lang="en-US"/>
+                        </a:p>
+                      </a:txBody>
+                      <a:tcPr>
+                        <a:blipFill rotWithShape="1">
+                          <a:blip r:embed="rId5"/>
+                          <a:stretch>
+                            <a:fillRect l="-535" t="-207692" r="-588235" b="-480000"/>
+                          </a:stretch>
+                        </a:blipFill>
+                      </a:tcPr>
+                    </a:tc>
+                    <a:tc>
+                      <a:txBody>
+                        <a:bodyPr/>
+                        <a:lstStyle/>
+                        <a:p>
+                          <a:r>
+                            <a:rPr lang="en-US" sz="2000" dirty="0" smtClean="0">
+                              <a:latin typeface="Calibri" panose="020F0502020204030204" pitchFamily="34" charset="0"/>
+                            </a:rPr>
+                            <a:t>The vector of explanatory variables</a:t>
+                          </a:r>
+                          <a:endParaRPr lang="en-US" sz="2000" dirty="0">
+                            <a:latin typeface="Calibri" panose="020F0502020204030204" pitchFamily="34" charset="0"/>
+                          </a:endParaRPr>
+                        </a:p>
+                      </a:txBody>
+                      <a:tcPr/>
+                    </a:tc>
+                  </a:tr>
+                  <a:tr h="701040">
+                    <a:tc>
+                      <a:txBody>
+                        <a:bodyPr/>
+                        <a:lstStyle/>
+                        <a:p>
+                          <a:endParaRPr lang="en-US"/>
+                        </a:p>
+                      </a:txBody>
+                      <a:tcPr>
+                        <a:blipFill rotWithShape="1">
+                          <a:blip r:embed="rId5"/>
+                          <a:stretch>
+                            <a:fillRect l="-535" t="-173913" r="-588235" b="-171304"/>
+                          </a:stretch>
+                        </a:blipFill>
+                      </a:tcPr>
+                    </a:tc>
+                    <a:tc>
+                      <a:txBody>
+                        <a:bodyPr/>
+                        <a:lstStyle/>
+                        <a:p>
+                          <a:r>
+                            <a:rPr lang="en-US" sz="2000" dirty="0" smtClean="0">
+                              <a:latin typeface="Calibri" panose="020F0502020204030204" pitchFamily="34" charset="0"/>
+                            </a:rPr>
+                            <a:t>The vector</a:t>
+                          </a:r>
+                          <a:r>
+                            <a:rPr lang="en-US" sz="2000" baseline="0" dirty="0" smtClean="0">
+                              <a:latin typeface="Calibri" panose="020F0502020204030204" pitchFamily="34" charset="0"/>
+                            </a:rPr>
+                            <a:t> of estimate parameters for each explanatory variable</a:t>
+                          </a:r>
+                          <a:endParaRPr lang="en-US" sz="2000" dirty="0">
+                            <a:latin typeface="Calibri" panose="020F0502020204030204" pitchFamily="34" charset="0"/>
+                          </a:endParaRPr>
+                        </a:p>
+                      </a:txBody>
+                      <a:tcPr/>
+                    </a:tc>
+                  </a:tr>
+                  <a:tr h="396240">
+                    <a:tc>
+                      <a:txBody>
+                        <a:bodyPr/>
+                        <a:lstStyle/>
+                        <a:p>
+                          <a:endParaRPr lang="en-US"/>
+                        </a:p>
+                      </a:txBody>
+                      <a:tcPr>
+                        <a:blipFill rotWithShape="1">
+                          <a:blip r:embed="rId5"/>
+                          <a:stretch>
+                            <a:fillRect l="-535" t="-484615" r="-588235" b="-203077"/>
+                          </a:stretch>
+                        </a:blipFill>
+                      </a:tcPr>
+                    </a:tc>
+                    <a:tc>
+                      <a:txBody>
+                        <a:bodyPr/>
+                        <a:lstStyle/>
+                        <a:p>
+                          <a:r>
+                            <a:rPr lang="en-US" sz="2000" dirty="0" smtClean="0">
+                              <a:latin typeface="Calibri" panose="020F0502020204030204" pitchFamily="34" charset="0"/>
+                            </a:rPr>
+                            <a:t>Error term</a:t>
+                          </a:r>
+                          <a:endParaRPr lang="en-US" sz="2000" dirty="0">
+                            <a:latin typeface="Calibri" panose="020F0502020204030204" pitchFamily="34" charset="0"/>
+                          </a:endParaRPr>
+                        </a:p>
+                      </a:txBody>
+                      <a:tcPr/>
+                    </a:tc>
+                  </a:tr>
+                  <a:tr h="701040">
+                    <a:tc>
+                      <a:txBody>
+                        <a:bodyPr/>
+                        <a:lstStyle/>
+                        <a:p>
+                          <a:endParaRPr lang="en-US"/>
+                        </a:p>
+                      </a:txBody>
+                      <a:tcPr>
+                        <a:blipFill rotWithShape="1">
+                          <a:blip r:embed="rId5"/>
+                          <a:stretch>
+                            <a:fillRect l="-535" t="-330435" r="-588235" b="-14783"/>
+                          </a:stretch>
+                        </a:blipFill>
+                      </a:tcPr>
+                    </a:tc>
+                    <a:tc>
+                      <a:txBody>
+                        <a:bodyPr/>
+                        <a:lstStyle/>
+                        <a:p>
+                          <a:r>
+                            <a:rPr lang="en-US" sz="2000" dirty="0" smtClean="0">
+                              <a:latin typeface="Calibri" panose="020F0502020204030204" pitchFamily="34" charset="0"/>
+                            </a:rPr>
+                            <a:t>The probability</a:t>
+                          </a:r>
+                          <a:r>
+                            <a:rPr lang="en-US" sz="2000" baseline="0" dirty="0" smtClean="0">
+                              <a:latin typeface="Calibri" panose="020F0502020204030204" pitchFamily="34" charset="0"/>
+                            </a:rPr>
+                            <a:t> of a large truck-involved crash (n) having a injury outcome </a:t>
+                          </a:r>
+                          <a:endParaRPr lang="en-US" sz="2000" dirty="0">
+                            <a:latin typeface="Calibri" panose="020F0502020204030204" pitchFamily="34" charset="0"/>
+                          </a:endParaRPr>
+                        </a:p>
+                      </a:txBody>
+                      <a:tcPr/>
+                    </a:tc>
+                  </a:tr>
+                </a:tbl>
+              </a:graphicData>
+            </a:graphic>
+          </p:graphicFrame>
+        </mc:Fallback>
+      </mc:AlternateContent>
+    </p:spTree>
+    <p:extLst>
+      <p:ext uri="{BB962C8B-B14F-4D97-AF65-F5344CB8AC3E}">
+        <p14:creationId xmlns:p14="http://schemas.microsoft.com/office/powerpoint/2010/main" val="3604801986"/>
       </p:ext>
     </p:extLst>
   </p:cSld>
@@ -7774,17 +9291,7 @@
                   </a:schemeClr>
                 </a:solidFill>
               </a:rPr>
-              <a:t>Principal Component Analysis (PCA</a:t>
-            </a:r>
-            <a:r>
-              <a:rPr lang="en-US" sz="2500" dirty="0" smtClean="0">
-                <a:solidFill>
-                  <a:schemeClr val="tx1">
-                    <a:lumMod val="50000"/>
-                  </a:schemeClr>
-                </a:solidFill>
-              </a:rPr>
-              <a:t>)</a:t>
+              <a:t>Principal Component Analysis (PCA)</a:t>
             </a:r>
           </a:p>
           <a:p>
@@ -8183,17 +9690,8 @@
             </a:r>
             <a:r>
               <a:rPr lang="en-US" dirty="0" smtClean="0"/>
-              <a:t>: </a:t>
-            </a:r>
-            <a:r>
-              <a:rPr lang="en-US" dirty="0" smtClean="0"/>
-              <a:t>The principal components are uncorrelated with each </a:t>
-            </a:r>
-            <a:r>
-              <a:rPr lang="en-US" dirty="0" smtClean="0"/>
-              <a:t>other and orthogonal.</a:t>
-            </a:r>
-            <a:endParaRPr lang="en-US" dirty="0" smtClean="0"/>
+              <a:t>: The principal components are uncorrelated with each other and orthogonal.</a:t>
+            </a:r>
           </a:p>
           <a:p>
             <a:pPr marL="0" indent="0">
@@ -8896,8 +10394,8 @@
           </a:p>
         </p:txBody>
       </p:sp>
-      <mc:AlternateContent xmlns:mc="http://schemas.openxmlformats.org/markup-compatibility/2006">
-        <mc:Choice xmlns:a14="http://schemas.microsoft.com/office/drawing/2010/main" Requires="a14">
+      <mc:AlternateContent xmlns:mc="http://schemas.openxmlformats.org/markup-compatibility/2006" xmlns:a14="http://schemas.microsoft.com/office/drawing/2010/main">
+        <mc:Choice Requires="a14">
           <p:sp>
             <p:nvSpPr>
               <p:cNvPr id="3" name="Content Placeholder 2"/>
@@ -8918,13 +10416,8 @@
                 </a:pPr>
                 <a:r>
                   <a:rPr lang="en-US" dirty="0" smtClean="0"/>
-                  <a:t>The </a:t>
+                  <a:t>The math behind PCA:</a:t>
                 </a:r>
-                <a:r>
-                  <a:rPr lang="en-US" dirty="0" smtClean="0"/>
-                  <a:t>math behind PCA:</a:t>
-                </a:r>
-                <a:endParaRPr lang="en-US" dirty="0" smtClean="0"/>
               </a:p>
               <a:p>
                 <a:r>
@@ -10006,7 +11499,7 @@
             </p:txBody>
           </p:sp>
         </mc:Choice>
-        <mc:Fallback>
+        <mc:Fallback xmlns="">
           <p:sp>
             <p:nvSpPr>
               <p:cNvPr id="3" name="Content Placeholder 2"/>
@@ -10331,7 +11824,7 @@
           </p:nvPr>
         </p:nvPicPr>
         <mc:AlternateContent xmlns:mc="http://schemas.openxmlformats.org/markup-compatibility/2006">
-          <mc:Choice xmlns:ma="http://schemas.microsoft.com/office/mac/drawingml/2008/main" xmlns:mv="urn:schemas-microsoft-com:mac:vml" xmlns="" Requires="ma">
+          <mc:Choice xmlns="" xmlns:mv="urn:schemas-microsoft-com:mac:vml" xmlns:ma="http://schemas.microsoft.com/office/mac/drawingml/2008/main" Requires="ma">
             <p:blipFill>
               <a:blip r:embed="rId3"/>
               <a:srcRect l="-2632" r="-2632"/>
@@ -10432,6 +11925,34 @@
               <a:t>8</a:t>
             </a:fld>
             <a:endParaRPr lang="en-US"/>
+          </a:p>
+        </p:txBody>
+      </p:sp>
+      <p:sp>
+        <p:nvSpPr>
+          <p:cNvPr id="3" name="Rectangle 2"/>
+          <p:cNvSpPr/>
+          <p:nvPr/>
+        </p:nvSpPr>
+        <p:spPr>
+          <a:xfrm>
+            <a:off x="1752600" y="1367581"/>
+            <a:ext cx="4572000" cy="830997"/>
+          </a:xfrm>
+          <a:prstGeom prst="rect">
+            <a:avLst/>
+          </a:prstGeom>
+        </p:spPr>
+        <p:txBody>
+          <a:bodyPr>
+            <a:spAutoFit/>
+          </a:bodyPr>
+          <a:lstStyle/>
+          <a:p>
+            <a:r>
+              <a:rPr lang="en-US" sz="2400" dirty="0"/>
+              <a:t>The data was heavily skewed in favor of the 1990s and 2000s</a:t>
+            </a:r>
           </a:p>
         </p:txBody>
       </p:sp>
@@ -10486,7 +12007,7 @@
           </p:nvPr>
         </p:nvPicPr>
         <mc:AlternateContent xmlns:mc="http://schemas.openxmlformats.org/markup-compatibility/2006">
-          <mc:Choice xmlns:ma="http://schemas.microsoft.com/office/mac/drawingml/2008/main" xmlns:mv="urn:schemas-microsoft-com:mac:vml" xmlns="" Requires="ma">
+          <mc:Choice xmlns="" xmlns:mv="urn:schemas-microsoft-com:mac:vml" xmlns:ma="http://schemas.microsoft.com/office/mac/drawingml/2008/main" Requires="ma">
             <p:blipFill>
               <a:blip r:embed="rId3"/>
               <a:srcRect l="-2632" r="-2632"/>

</xml_diff>

<commit_message>
moved distribution of songs graph to the beginning
</commit_message>
<xml_diff>
--- a/Project3_presentation-1.pptx
+++ b/Project3_presentation-1.pptx
@@ -11,11 +11,11 @@
     <p:sldId id="257" r:id="rId2"/>
     <p:sldId id="258" r:id="rId3"/>
     <p:sldId id="259" r:id="rId4"/>
-    <p:sldId id="266" r:id="rId5"/>
-    <p:sldId id="269" r:id="rId6"/>
-    <p:sldId id="268" r:id="rId7"/>
-    <p:sldId id="276" r:id="rId8"/>
-    <p:sldId id="270" r:id="rId9"/>
+    <p:sldId id="279" r:id="rId5"/>
+    <p:sldId id="266" r:id="rId6"/>
+    <p:sldId id="269" r:id="rId7"/>
+    <p:sldId id="268" r:id="rId8"/>
+    <p:sldId id="276" r:id="rId9"/>
     <p:sldId id="274" r:id="rId10"/>
     <p:sldId id="273" r:id="rId11"/>
     <p:sldId id="275" r:id="rId12"/>
@@ -941,18 +941,16 @@
         </p:nvSpPr>
         <p:spPr/>
         <p:txBody>
-          <a:bodyPr/>
+          <a:bodyPr>
+            <a:normAutofit/>
+          </a:bodyPr>
           <a:lstStyle/>
           <a:p>
             <a:r>
-              <a:rPr lang="en-US" dirty="0" smtClean="0"/>
-              <a:t>Eigenvector</a:t>
-            </a:r>
-            <a:r>
-              <a:rPr lang="en-US" baseline="0" dirty="0" smtClean="0"/>
-              <a:t> is PCA</a:t>
-            </a:r>
-            <a:endParaRPr lang="en-US" dirty="0"/>
+              <a:rPr lang="en-US" sz="1500" baseline="0" dirty="0" smtClean="0"/>
+              <a:t>Original distribution of songs in dataset</a:t>
+            </a:r>
+            <a:endParaRPr lang="en-US" sz="1500" baseline="0" dirty="0"/>
           </a:p>
         </p:txBody>
       </p:sp>
@@ -974,18 +972,13 @@
             <a:fld id="{455CFC28-9D59-4D12-B647-75BCBE6E8E28}" type="slidenum">
               <a:rPr lang="en-US" smtClean="0"/>
               <a:pPr/>
-              <a:t>5</a:t>
+              <a:t>4</a:t>
             </a:fld>
             <a:endParaRPr lang="en-US"/>
           </a:p>
         </p:txBody>
       </p:sp>
     </p:spTree>
-    <p:extLst>
-      <p:ext uri="{BB962C8B-B14F-4D97-AF65-F5344CB8AC3E}">
-        <p14:creationId xmlns:p14="http://schemas.microsoft.com/office/powerpoint/2010/main" val="1246933515"/>
-      </p:ext>
-    </p:extLst>
   </p:cSld>
   <p:clrMapOvr>
     <a:masterClrMapping/>
@@ -1034,16 +1027,18 @@
         </p:nvSpPr>
         <p:spPr/>
         <p:txBody>
-          <a:bodyPr>
-            <a:normAutofit/>
-          </a:bodyPr>
+          <a:bodyPr/>
           <a:lstStyle/>
           <a:p>
             <a:r>
-              <a:rPr lang="en-US" sz="1500" baseline="0" dirty="0" smtClean="0"/>
-              <a:t>Original distribution of songs in dataset</a:t>
-            </a:r>
-            <a:endParaRPr lang="en-US" sz="1500" baseline="0" dirty="0"/>
+              <a:rPr lang="en-US" dirty="0" smtClean="0"/>
+              <a:t>Eigenvector</a:t>
+            </a:r>
+            <a:r>
+              <a:rPr lang="en-US" baseline="0" dirty="0" smtClean="0"/>
+              <a:t> is PCA</a:t>
+            </a:r>
+            <a:endParaRPr lang="en-US" dirty="0"/>
           </a:p>
         </p:txBody>
       </p:sp>
@@ -1065,13 +1060,18 @@
             <a:fld id="{455CFC28-9D59-4D12-B647-75BCBE6E8E28}" type="slidenum">
               <a:rPr lang="en-US" smtClean="0"/>
               <a:pPr/>
-              <a:t>8</a:t>
+              <a:t>6</a:t>
             </a:fld>
             <a:endParaRPr lang="en-US"/>
           </a:p>
         </p:txBody>
       </p:sp>
     </p:spTree>
+    <p:extLst>
+      <p:ext uri="{BB962C8B-B14F-4D97-AF65-F5344CB8AC3E}">
+        <p14:creationId xmlns:p14="http://schemas.microsoft.com/office/powerpoint/2010/main" val="1246933515"/>
+      </p:ext>
+    </p:extLst>
   </p:cSld>
   <p:clrMapOvr>
     <a:masterClrMapping/>
@@ -9430,8 +9430,8 @@
           <a:lstStyle/>
           <a:p>
             <a:r>
-              <a:rPr lang="en-US" sz="4400" dirty="0" smtClean="0"/>
-              <a:t>Data</a:t>
+              <a:rPr lang="en-US" sz="4400" smtClean="0"/>
+              <a:t>Data Background</a:t>
             </a:r>
             <a:endParaRPr lang="en-US" sz="4400" dirty="0"/>
           </a:p>
@@ -9633,6 +9633,43 @@
           <a:chExt cx="0" cy="0"/>
         </a:xfrm>
       </p:grpSpPr>
+      <p:pic>
+        <p:nvPicPr>
+          <p:cNvPr id="6" name="Content Placeholder 5" descr="year_dist.pdf"/>
+          <p:cNvPicPr>
+            <a:picLocks noGrp="1" noChangeAspect="1"/>
+          </p:cNvPicPr>
+          <p:nvPr>
+            <p:ph idx="1"/>
+          </p:nvPr>
+        </p:nvPicPr>
+        <mc:AlternateContent xmlns:mc="http://schemas.openxmlformats.org/markup-compatibility/2006">
+          <mc:Choice xmlns="" xmlns:mv="urn:schemas-microsoft-com:mac:vml" xmlns:ma="http://schemas.microsoft.com/office/mac/drawingml/2008/main" Requires="ma">
+            <p:blipFill>
+              <a:blip r:embed="rId3"/>
+              <a:srcRect l="-2632" r="-2632"/>
+              <a:stretch>
+                <a:fillRect/>
+              </a:stretch>
+            </p:blipFill>
+          </mc:Choice>
+          <mc:Fallback>
+            <p:blipFill>
+              <a:blip r:embed="rId4"/>
+              <a:srcRect l="-2632" r="-2632"/>
+              <a:stretch>
+                <a:fillRect/>
+              </a:stretch>
+            </p:blipFill>
+          </mc:Fallback>
+        </mc:AlternateContent>
+        <p:spPr>
+          <a:xfrm>
+            <a:off x="228600" y="1143000"/>
+            <a:ext cx="8686800" cy="4584700"/>
+          </a:xfrm>
+        </p:spPr>
+      </p:pic>
       <p:sp>
         <p:nvSpPr>
           <p:cNvPr id="2" name="Title 1"/>
@@ -9650,57 +9687,9 @@
           <a:p>
             <a:r>
               <a:rPr lang="en-US" sz="4400" dirty="0" smtClean="0"/>
-              <a:t>Principal Components Analysis</a:t>
+              <a:t>Data</a:t>
             </a:r>
             <a:endParaRPr lang="en-US" sz="4400" dirty="0"/>
-          </a:p>
-        </p:txBody>
-      </p:sp>
-      <p:sp>
-        <p:nvSpPr>
-          <p:cNvPr id="3" name="Content Placeholder 2"/>
-          <p:cNvSpPr>
-            <a:spLocks noGrp="1"/>
-          </p:cNvSpPr>
-          <p:nvPr>
-            <p:ph idx="1"/>
-          </p:nvPr>
-        </p:nvSpPr>
-        <p:spPr/>
-        <p:txBody>
-          <a:bodyPr/>
-          <a:lstStyle/>
-          <a:p>
-            <a:r>
-              <a:rPr lang="en-US" dirty="0" smtClean="0"/>
-              <a:t>In general, PCA is used as a dimension reduction technique. </a:t>
-            </a:r>
-          </a:p>
-          <a:p>
-            <a:r>
-              <a:rPr lang="en-US" dirty="0" smtClean="0"/>
-              <a:t>It finds linear combinations of the variables that explain maximal possible variance under a constraint.</a:t>
-            </a:r>
-          </a:p>
-          <a:p>
-            <a:pPr lvl="1"/>
-            <a:r>
-              <a:rPr lang="en-US" i="1" dirty="0" smtClean="0"/>
-              <a:t>Constraint</a:t>
-            </a:r>
-            <a:r>
-              <a:rPr lang="en-US" dirty="0" smtClean="0"/>
-              <a:t>: The principal components are uncorrelated with each other and orthogonal.</a:t>
-            </a:r>
-          </a:p>
-          <a:p>
-            <a:pPr marL="0" indent="0">
-              <a:buNone/>
-            </a:pPr>
-            <a:endParaRPr lang="en-US" dirty="0" smtClean="0"/>
-          </a:p>
-          <a:p>
-            <a:endParaRPr lang="en-US" dirty="0" smtClean="0"/>
           </a:p>
         </p:txBody>
       </p:sp>
@@ -9754,6 +9743,172 @@
                 <a:defRPr/>
               </a:pPr>
               <a:t>4</a:t>
+            </a:fld>
+            <a:endParaRPr lang="en-US"/>
+          </a:p>
+        </p:txBody>
+      </p:sp>
+    </p:spTree>
+    <p:extLst>
+      <p:ext uri="{BB962C8B-B14F-4D97-AF65-F5344CB8AC3E}">
+        <p14:creationId xmlns:p14="http://schemas.microsoft.com/office/powerpoint/2010/main" val="771466066"/>
+      </p:ext>
+    </p:extLst>
+  </p:cSld>
+  <p:clrMapOvr>
+    <a:masterClrMapping/>
+  </p:clrMapOvr>
+  <p:transition>
+    <p:fade/>
+  </p:transition>
+  <p:timing>
+    <p:tnLst>
+      <p:par>
+        <p:cTn id="1" dur="indefinite" restart="never" nodeType="tmRoot"/>
+      </p:par>
+    </p:tnLst>
+  </p:timing>
+</p:sld>
+</file>
+
+<file path=ppt/slides/slide5.xml><?xml version="1.0" encoding="utf-8"?>
+<p:sld xmlns:a="http://schemas.openxmlformats.org/drawingml/2006/main" xmlns:r="http://schemas.openxmlformats.org/officeDocument/2006/relationships" xmlns:p="http://schemas.openxmlformats.org/presentationml/2006/main">
+  <p:cSld>
+    <p:spTree>
+      <p:nvGrpSpPr>
+        <p:cNvPr id="1" name=""/>
+        <p:cNvGrpSpPr/>
+        <p:nvPr/>
+      </p:nvGrpSpPr>
+      <p:grpSpPr>
+        <a:xfrm>
+          <a:off x="0" y="0"/>
+          <a:ext cx="0" cy="0"/>
+          <a:chOff x="0" y="0"/>
+          <a:chExt cx="0" cy="0"/>
+        </a:xfrm>
+      </p:grpSpPr>
+      <p:sp>
+        <p:nvSpPr>
+          <p:cNvPr id="2" name="Title 1"/>
+          <p:cNvSpPr>
+            <a:spLocks noGrp="1"/>
+          </p:cNvSpPr>
+          <p:nvPr>
+            <p:ph type="title"/>
+          </p:nvPr>
+        </p:nvSpPr>
+        <p:spPr/>
+        <p:txBody>
+          <a:bodyPr/>
+          <a:lstStyle/>
+          <a:p>
+            <a:r>
+              <a:rPr lang="en-US" sz="4400" dirty="0" smtClean="0"/>
+              <a:t>Principal Components Analysis</a:t>
+            </a:r>
+            <a:endParaRPr lang="en-US" sz="4400" dirty="0"/>
+          </a:p>
+        </p:txBody>
+      </p:sp>
+      <p:sp>
+        <p:nvSpPr>
+          <p:cNvPr id="3" name="Content Placeholder 2"/>
+          <p:cNvSpPr>
+            <a:spLocks noGrp="1"/>
+          </p:cNvSpPr>
+          <p:nvPr>
+            <p:ph idx="1"/>
+          </p:nvPr>
+        </p:nvSpPr>
+        <p:spPr/>
+        <p:txBody>
+          <a:bodyPr/>
+          <a:lstStyle/>
+          <a:p>
+            <a:r>
+              <a:rPr lang="en-US" dirty="0" smtClean="0"/>
+              <a:t>In general, PCA is used as a dimension reduction technique. </a:t>
+            </a:r>
+          </a:p>
+          <a:p>
+            <a:r>
+              <a:rPr lang="en-US" dirty="0" smtClean="0"/>
+              <a:t>It finds linear combinations of the variables that explain maximal possible variance under a constraint.</a:t>
+            </a:r>
+          </a:p>
+          <a:p>
+            <a:pPr lvl="1"/>
+            <a:r>
+              <a:rPr lang="en-US" i="1" dirty="0" smtClean="0"/>
+              <a:t>Constraint</a:t>
+            </a:r>
+            <a:r>
+              <a:rPr lang="en-US" dirty="0" smtClean="0"/>
+              <a:t>: The principal components are uncorrelated with each other and orthogonal.</a:t>
+            </a:r>
+          </a:p>
+          <a:p>
+            <a:pPr marL="0" indent="0">
+              <a:buNone/>
+            </a:pPr>
+            <a:endParaRPr lang="en-US" dirty="0" smtClean="0"/>
+          </a:p>
+          <a:p>
+            <a:endParaRPr lang="en-US" dirty="0" smtClean="0"/>
+          </a:p>
+        </p:txBody>
+      </p:sp>
+      <p:sp>
+        <p:nvSpPr>
+          <p:cNvPr id="4" name="Date Placeholder 3"/>
+          <p:cNvSpPr>
+            <a:spLocks noGrp="1"/>
+          </p:cNvSpPr>
+          <p:nvPr>
+            <p:ph type="dt" sz="half" idx="10"/>
+          </p:nvPr>
+        </p:nvSpPr>
+        <p:spPr/>
+        <p:txBody>
+          <a:bodyPr/>
+          <a:lstStyle/>
+          <a:p>
+            <a:pPr>
+              <a:defRPr/>
+            </a:pPr>
+            <a:r>
+              <a:rPr lang="en-US" dirty="0" smtClean="0"/>
+              <a:t>June 2, 2014</a:t>
+            </a:r>
+            <a:endParaRPr lang="en-US" dirty="0"/>
+          </a:p>
+        </p:txBody>
+      </p:sp>
+      <p:sp>
+        <p:nvSpPr>
+          <p:cNvPr id="5" name="Slide Number Placeholder 4"/>
+          <p:cNvSpPr>
+            <a:spLocks noGrp="1"/>
+          </p:cNvSpPr>
+          <p:nvPr>
+            <p:ph type="sldNum" sz="quarter" idx="11"/>
+          </p:nvPr>
+        </p:nvSpPr>
+        <p:spPr/>
+        <p:txBody>
+          <a:bodyPr/>
+          <a:lstStyle/>
+          <a:p>
+            <a:pPr>
+              <a:defRPr/>
+            </a:pPr>
+            <a:fld id="{8A8258B9-01E1-BA41-A991-9A187DF9FB72}" type="slidenum">
+              <a:rPr lang="en-US" smtClean="0"/>
+              <a:pPr>
+                <a:defRPr/>
+              </a:pPr>
+              <a:t>5</a:t>
             </a:fld>
             <a:endParaRPr lang="en-US"/>
           </a:p>
@@ -9775,7 +9930,7 @@
 </p:sld>
 </file>
 
-<file path=ppt/slides/slide5.xml><?xml version="1.0" encoding="utf-8"?>
+<file path=ppt/slides/slide6.xml><?xml version="1.0" encoding="utf-8"?>
 <p:sld xmlns:a="http://schemas.openxmlformats.org/drawingml/2006/main" xmlns:r="http://schemas.openxmlformats.org/officeDocument/2006/relationships" xmlns:p="http://schemas.openxmlformats.org/presentationml/2006/main">
   <p:cSld>
     <p:spTree>
@@ -10332,7 +10487,7 @@
               <a:pPr>
                 <a:defRPr/>
               </a:pPr>
-              <a:t>5</a:t>
+              <a:t>6</a:t>
             </a:fld>
             <a:endParaRPr lang="en-US"/>
           </a:p>
@@ -10354,7 +10509,7 @@
 </p:sld>
 </file>
 
-<file path=ppt/slides/slide6.xml><?xml version="1.0" encoding="utf-8"?>
+<file path=ppt/slides/slide7.xml><?xml version="1.0" encoding="utf-8"?>
 <p:sld xmlns:a="http://schemas.openxmlformats.org/drawingml/2006/main" xmlns:r="http://schemas.openxmlformats.org/officeDocument/2006/relationships" xmlns:p="http://schemas.openxmlformats.org/presentationml/2006/main">
   <p:cSld>
     <p:spTree>
@@ -11582,7 +11737,7 @@
               <a:pPr>
                 <a:defRPr/>
               </a:pPr>
-              <a:t>6</a:t>
+              <a:t>7</a:t>
             </a:fld>
             <a:endParaRPr lang="en-US"/>
           </a:p>
@@ -11592,198 +11747,6 @@
     <p:extLst>
       <p:ext uri="{BB962C8B-B14F-4D97-AF65-F5344CB8AC3E}">
         <p14:creationId xmlns:p14="http://schemas.microsoft.com/office/powerpoint/2010/main" val="2591775415"/>
-      </p:ext>
-    </p:extLst>
-  </p:cSld>
-  <p:clrMapOvr>
-    <a:masterClrMapping/>
-  </p:clrMapOvr>
-  <p:transition>
-    <p:fade/>
-  </p:transition>
-</p:sld>
-</file>
-
-<file path=ppt/slides/slide7.xml><?xml version="1.0" encoding="utf-8"?>
-<p:sld xmlns:a="http://schemas.openxmlformats.org/drawingml/2006/main" xmlns:r="http://schemas.openxmlformats.org/officeDocument/2006/relationships" xmlns:p="http://schemas.openxmlformats.org/presentationml/2006/main">
-  <p:cSld>
-    <p:spTree>
-      <p:nvGrpSpPr>
-        <p:cNvPr id="1" name=""/>
-        <p:cNvGrpSpPr/>
-        <p:nvPr/>
-      </p:nvGrpSpPr>
-      <p:grpSpPr>
-        <a:xfrm>
-          <a:off x="0" y="0"/>
-          <a:ext cx="0" cy="0"/>
-          <a:chOff x="0" y="0"/>
-          <a:chExt cx="0" cy="0"/>
-        </a:xfrm>
-      </p:grpSpPr>
-      <p:sp>
-        <p:nvSpPr>
-          <p:cNvPr id="2" name="Title 1"/>
-          <p:cNvSpPr>
-            <a:spLocks noGrp="1"/>
-          </p:cNvSpPr>
-          <p:nvPr>
-            <p:ph type="title"/>
-          </p:nvPr>
-        </p:nvSpPr>
-        <p:spPr/>
-        <p:txBody>
-          <a:bodyPr/>
-          <a:lstStyle/>
-          <a:p>
-            <a:pPr algn="ctr"/>
-            <a:r>
-              <a:rPr lang="en-US" sz="4400" dirty="0" smtClean="0"/>
-              <a:t>Methods of Prediction</a:t>
-            </a:r>
-            <a:endParaRPr lang="en-US" sz="4400" dirty="0"/>
-          </a:p>
-        </p:txBody>
-      </p:sp>
-      <p:sp>
-        <p:nvSpPr>
-          <p:cNvPr id="3" name="Content Placeholder 2"/>
-          <p:cNvSpPr>
-            <a:spLocks noGrp="1"/>
-          </p:cNvSpPr>
-          <p:nvPr>
-            <p:ph idx="1"/>
-          </p:nvPr>
-        </p:nvSpPr>
-        <p:spPr/>
-        <p:txBody>
-          <a:bodyPr/>
-          <a:lstStyle/>
-          <a:p>
-            <a:pPr lvl="1"/>
-            <a:r>
-              <a:rPr lang="en-US" sz="2400" dirty="0" smtClean="0"/>
-              <a:t>PCA reduced the number of the predictors from 90 to 8.</a:t>
-            </a:r>
-          </a:p>
-          <a:p>
-            <a:pPr lvl="1"/>
-            <a:r>
-              <a:rPr lang="en-US" sz="2400" dirty="0" smtClean="0"/>
-              <a:t>Used these 8 PCs as predictors in a linear regression on year</a:t>
-            </a:r>
-          </a:p>
-          <a:p>
-            <a:pPr lvl="1"/>
-            <a:r>
-              <a:rPr lang="en-US" sz="2400" dirty="0" smtClean="0"/>
-              <a:t>Looked at original 90 predictors using regression</a:t>
-            </a:r>
-          </a:p>
-          <a:p>
-            <a:pPr lvl="1"/>
-            <a:r>
-              <a:rPr lang="en-US" sz="2400" dirty="0" smtClean="0"/>
-              <a:t>Looked at using the 12 timbre averages as predictors</a:t>
-            </a:r>
-          </a:p>
-          <a:p>
-            <a:pPr lvl="1"/>
-            <a:r>
-              <a:rPr lang="en-US" sz="2400" dirty="0" smtClean="0"/>
-              <a:t>Lastly, looked at grouping the song years into three categories and using the 8 principal components in a multinomial regression</a:t>
-            </a:r>
-          </a:p>
-          <a:p>
-            <a:pPr lvl="3"/>
-            <a:r>
-              <a:rPr lang="en-US" sz="2400" dirty="0" smtClean="0"/>
-              <a:t>Pre-1960</a:t>
-            </a:r>
-          </a:p>
-          <a:p>
-            <a:pPr lvl="3"/>
-            <a:r>
-              <a:rPr lang="en-US" sz="2400" dirty="0" smtClean="0"/>
-              <a:t>1960-1989</a:t>
-            </a:r>
-          </a:p>
-          <a:p>
-            <a:pPr lvl="3"/>
-            <a:r>
-              <a:rPr lang="en-US" sz="2400" dirty="0" smtClean="0"/>
-              <a:t>Post-1990</a:t>
-            </a:r>
-          </a:p>
-          <a:p>
-            <a:pPr lvl="1"/>
-            <a:endParaRPr lang="en-US" dirty="0"/>
-          </a:p>
-          <a:p>
-            <a:pPr lvl="1"/>
-            <a:endParaRPr lang="en-US" dirty="0"/>
-          </a:p>
-        </p:txBody>
-      </p:sp>
-      <p:sp>
-        <p:nvSpPr>
-          <p:cNvPr id="4" name="Date Placeholder 3"/>
-          <p:cNvSpPr>
-            <a:spLocks noGrp="1"/>
-          </p:cNvSpPr>
-          <p:nvPr>
-            <p:ph type="dt" sz="half" idx="10"/>
-          </p:nvPr>
-        </p:nvSpPr>
-        <p:spPr/>
-        <p:txBody>
-          <a:bodyPr/>
-          <a:lstStyle/>
-          <a:p>
-            <a:pPr>
-              <a:defRPr/>
-            </a:pPr>
-            <a:r>
-              <a:rPr lang="en-US" dirty="0" smtClean="0"/>
-              <a:t>June 2, 2014</a:t>
-            </a:r>
-            <a:endParaRPr lang="en-US" dirty="0"/>
-          </a:p>
-        </p:txBody>
-      </p:sp>
-      <p:sp>
-        <p:nvSpPr>
-          <p:cNvPr id="5" name="Slide Number Placeholder 4"/>
-          <p:cNvSpPr>
-            <a:spLocks noGrp="1"/>
-          </p:cNvSpPr>
-          <p:nvPr>
-            <p:ph type="sldNum" sz="quarter" idx="11"/>
-          </p:nvPr>
-        </p:nvSpPr>
-        <p:spPr/>
-        <p:txBody>
-          <a:bodyPr/>
-          <a:lstStyle/>
-          <a:p>
-            <a:pPr>
-              <a:defRPr/>
-            </a:pPr>
-            <a:fld id="{8A8258B9-01E1-BA41-A991-9A187DF9FB72}" type="slidenum">
-              <a:rPr lang="en-US" smtClean="0"/>
-              <a:pPr>
-                <a:defRPr/>
-              </a:pPr>
-              <a:t>7</a:t>
-            </a:fld>
-            <a:endParaRPr lang="en-US"/>
-          </a:p>
-        </p:txBody>
-      </p:sp>
-    </p:spTree>
-    <p:extLst>
-      <p:ext uri="{BB962C8B-B14F-4D97-AF65-F5344CB8AC3E}">
-        <p14:creationId xmlns:p14="http://schemas.microsoft.com/office/powerpoint/2010/main" val="3822143910"/>
       </p:ext>
     </p:extLst>
   </p:cSld>
@@ -11813,63 +11776,107 @@
           <a:chExt cx="0" cy="0"/>
         </a:xfrm>
       </p:grpSpPr>
-      <p:pic>
-        <p:nvPicPr>
-          <p:cNvPr id="6" name="Content Placeholder 5" descr="year_dist.pdf"/>
-          <p:cNvPicPr>
-            <a:picLocks noGrp="1" noChangeAspect="1"/>
-          </p:cNvPicPr>
+      <p:sp>
+        <p:nvSpPr>
+          <p:cNvPr id="2" name="Title 1"/>
+          <p:cNvSpPr>
+            <a:spLocks noGrp="1"/>
+          </p:cNvSpPr>
+          <p:nvPr>
+            <p:ph type="title"/>
+          </p:nvPr>
+        </p:nvSpPr>
+        <p:spPr/>
+        <p:txBody>
+          <a:bodyPr/>
+          <a:lstStyle/>
+          <a:p>
+            <a:pPr algn="ctr"/>
+            <a:r>
+              <a:rPr lang="en-US" sz="4400" dirty="0" smtClean="0"/>
+              <a:t>Methods of Prediction</a:t>
+            </a:r>
+            <a:endParaRPr lang="en-US" sz="4400" dirty="0"/>
+          </a:p>
+        </p:txBody>
+      </p:sp>
+      <p:sp>
+        <p:nvSpPr>
+          <p:cNvPr id="3" name="Content Placeholder 2"/>
+          <p:cNvSpPr>
+            <a:spLocks noGrp="1"/>
+          </p:cNvSpPr>
           <p:nvPr>
             <p:ph idx="1"/>
           </p:nvPr>
-        </p:nvPicPr>
-        <mc:AlternateContent xmlns:mc="http://schemas.openxmlformats.org/markup-compatibility/2006">
-          <mc:Choice xmlns="" xmlns:mv="urn:schemas-microsoft-com:mac:vml" xmlns:ma="http://schemas.microsoft.com/office/mac/drawingml/2008/main" Requires="ma">
-            <p:blipFill>
-              <a:blip r:embed="rId3"/>
-              <a:srcRect l="-2632" r="-2632"/>
-              <a:stretch>
-                <a:fillRect/>
-              </a:stretch>
-            </p:blipFill>
-          </mc:Choice>
-          <mc:Fallback>
-            <p:blipFill>
-              <a:blip r:embed="rId4"/>
-              <a:srcRect l="-2632" r="-2632"/>
-              <a:stretch>
-                <a:fillRect/>
-              </a:stretch>
-            </p:blipFill>
-          </mc:Fallback>
-        </mc:AlternateContent>
-        <p:spPr>
-          <a:xfrm>
-            <a:off x="228600" y="1143000"/>
-            <a:ext cx="8686800" cy="4584700"/>
-          </a:xfrm>
-        </p:spPr>
-      </p:pic>
-      <p:sp>
-        <p:nvSpPr>
-          <p:cNvPr id="2" name="Title 1"/>
-          <p:cNvSpPr>
-            <a:spLocks noGrp="1"/>
-          </p:cNvSpPr>
-          <p:nvPr>
-            <p:ph type="title"/>
-          </p:nvPr>
         </p:nvSpPr>
         <p:spPr/>
         <p:txBody>
           <a:bodyPr/>
           <a:lstStyle/>
           <a:p>
-            <a:r>
-              <a:rPr lang="en-US" sz="4400" dirty="0" smtClean="0"/>
-              <a:t>Findings</a:t>
-            </a:r>
-            <a:endParaRPr lang="en-US" sz="4400" dirty="0"/>
+            <a:pPr lvl="1"/>
+            <a:r>
+              <a:rPr lang="en-US" sz="2400" dirty="0" smtClean="0"/>
+              <a:t>PCA reduced the number of the predictors from 90 to 8.</a:t>
+            </a:r>
+          </a:p>
+          <a:p>
+            <a:pPr lvl="1"/>
+            <a:r>
+              <a:rPr lang="en-US" sz="2400" dirty="0" smtClean="0"/>
+              <a:t>Used these 8 PCs as predictors in a linear regression on year</a:t>
+            </a:r>
+          </a:p>
+          <a:p>
+            <a:pPr lvl="1"/>
+            <a:r>
+              <a:rPr lang="en-US" sz="2400" dirty="0" smtClean="0"/>
+              <a:t>Looked at original 90 predictors using regression</a:t>
+            </a:r>
+          </a:p>
+          <a:p>
+            <a:pPr lvl="1"/>
+            <a:r>
+              <a:rPr lang="en-US" sz="2400" dirty="0" smtClean="0"/>
+              <a:t>Looked at using the 12 timbre averages as predictors</a:t>
+            </a:r>
+          </a:p>
+          <a:p>
+            <a:pPr lvl="1"/>
+            <a:r>
+              <a:rPr lang="en-US" sz="2400" dirty="0" smtClean="0"/>
+              <a:t>Lastly, looked at grouping the song years into three categories and using the 8 principal components in a multinomial regression</a:t>
+            </a:r>
+          </a:p>
+          <a:p>
+            <a:pPr lvl="3"/>
+            <a:r>
+              <a:rPr lang="en-US" sz="2400" dirty="0" smtClean="0"/>
+              <a:t>Pre-1960</a:t>
+            </a:r>
+          </a:p>
+          <a:p>
+            <a:pPr lvl="3"/>
+            <a:r>
+              <a:rPr lang="en-US" sz="2400" dirty="0" smtClean="0"/>
+              <a:t>1960-1989</a:t>
+            </a:r>
+          </a:p>
+          <a:p>
+            <a:pPr lvl="3"/>
+            <a:r>
+              <a:rPr lang="en-US" sz="2400" dirty="0" smtClean="0"/>
+              <a:t>Post-1990</a:t>
+            </a:r>
+          </a:p>
+          <a:p>
+            <a:pPr lvl="1"/>
+            <a:endParaRPr lang="en-US" dirty="0"/>
+          </a:p>
+          <a:p>
+            <a:pPr lvl="1"/>
+            <a:endParaRPr lang="en-US" dirty="0"/>
           </a:p>
         </p:txBody>
       </p:sp>
@@ -11928,38 +11935,10 @@
           </a:p>
         </p:txBody>
       </p:sp>
-      <p:sp>
-        <p:nvSpPr>
-          <p:cNvPr id="3" name="Rectangle 2"/>
-          <p:cNvSpPr/>
-          <p:nvPr/>
-        </p:nvSpPr>
-        <p:spPr>
-          <a:xfrm>
-            <a:off x="1752600" y="1367581"/>
-            <a:ext cx="4572000" cy="830997"/>
-          </a:xfrm>
-          <a:prstGeom prst="rect">
-            <a:avLst/>
-          </a:prstGeom>
-        </p:spPr>
-        <p:txBody>
-          <a:bodyPr>
-            <a:spAutoFit/>
-          </a:bodyPr>
-          <a:lstStyle/>
-          <a:p>
-            <a:r>
-              <a:rPr lang="en-US" sz="2400" dirty="0"/>
-              <a:t>The data was heavily skewed in favor of the 1990s and 2000s</a:t>
-            </a:r>
-          </a:p>
-        </p:txBody>
-      </p:sp>
     </p:spTree>
     <p:extLst>
       <p:ext uri="{BB962C8B-B14F-4D97-AF65-F5344CB8AC3E}">
-        <p14:creationId xmlns:p14="http://schemas.microsoft.com/office/powerpoint/2010/main" val="3170237878"/>
+        <p14:creationId xmlns:p14="http://schemas.microsoft.com/office/powerpoint/2010/main" val="3822143910"/>
       </p:ext>
     </p:extLst>
   </p:cSld>
@@ -11969,13 +11948,6 @@
   <p:transition>
     <p:fade/>
   </p:transition>
-  <p:timing>
-    <p:tnLst>
-      <p:par>
-        <p:cTn id="1" dur="indefinite" restart="never" nodeType="tmRoot"/>
-      </p:par>
-    </p:tnLst>
-  </p:timing>
 </p:sld>
 </file>
 
@@ -12111,6 +12083,34 @@
               <a:t>9</a:t>
             </a:fld>
             <a:endParaRPr lang="en-US"/>
+          </a:p>
+        </p:txBody>
+      </p:sp>
+      <p:sp>
+        <p:nvSpPr>
+          <p:cNvPr id="6" name="Rectangle 5"/>
+          <p:cNvSpPr/>
+          <p:nvPr/>
+        </p:nvSpPr>
+        <p:spPr>
+          <a:xfrm>
+            <a:off x="1752600" y="1367581"/>
+            <a:ext cx="4572000" cy="830997"/>
+          </a:xfrm>
+          <a:prstGeom prst="rect">
+            <a:avLst/>
+          </a:prstGeom>
+        </p:spPr>
+        <p:txBody>
+          <a:bodyPr>
+            <a:spAutoFit/>
+          </a:bodyPr>
+          <a:lstStyle/>
+          <a:p>
+            <a:r>
+              <a:rPr lang="en-US" sz="2400" dirty="0"/>
+              <a:t>The data was heavily skewed in favor of the 1990s and 2000s</a:t>
+            </a:r>
           </a:p>
         </p:txBody>
       </p:sp>

</xml_diff>